<commit_message>
Final Updates to materials
</commit_message>
<xml_diff>
--- a/slides/QLS-MiCM_StatisticsInR.pptx
+++ b/slides/QLS-MiCM_StatisticsInR.pptx
@@ -164,7 +164,7 @@
 <file path=ppt/revisionInfo.xml><?xml version="1.0" encoding="utf-8"?>
 <p1510:revInfo xmlns:a="http://schemas.openxmlformats.org/drawingml/2006/main" xmlns:r="http://schemas.openxmlformats.org/officeDocument/2006/relationships" xmlns:p1510="http://schemas.microsoft.com/office/powerpoint/2015/10/main">
   <p1510:revLst>
-    <p1510:client id="{ECB69157-50F4-4BCE-8F3E-6963454F02B1}" v="2" dt="2025-02-19T15:30:30.484"/>
+    <p1510:client id="{ECB69157-50F4-4BCE-8F3E-6963454F02B1}" v="64" dt="2025-02-20T17:16:50.767"/>
   </p1510:revLst>
 </p1510:revInfo>
 </file>
@@ -561,7 +561,7 @@
   <pc:docChgLst>
     <pc:chgData name="Adrien Osakwe" userId="7a3e290c-eb83-484b-8e3d-d46ef2333477" providerId="ADAL" clId="{ECB69157-50F4-4BCE-8F3E-6963454F02B1}"/>
     <pc:docChg chg="custSel addSld delSld modSld sldOrd">
-      <pc:chgData name="Adrien Osakwe" userId="7a3e290c-eb83-484b-8e3d-d46ef2333477" providerId="ADAL" clId="{ECB69157-50F4-4BCE-8F3E-6963454F02B1}" dt="2025-02-20T05:18:29.174" v="172" actId="207"/>
+      <pc:chgData name="Adrien Osakwe" userId="7a3e290c-eb83-484b-8e3d-d46ef2333477" providerId="ADAL" clId="{ECB69157-50F4-4BCE-8F3E-6963454F02B1}" dt="2025-02-20T17:16:50.767" v="423"/>
       <pc:docMkLst>
         <pc:docMk/>
       </pc:docMkLst>
@@ -651,13 +651,13 @@
         </pc:picChg>
       </pc:sldChg>
       <pc:sldChg chg="modSp mod">
-        <pc:chgData name="Adrien Osakwe" userId="7a3e290c-eb83-484b-8e3d-d46ef2333477" providerId="ADAL" clId="{ECB69157-50F4-4BCE-8F3E-6963454F02B1}" dt="2025-02-19T21:16:34.116" v="139" actId="20577"/>
+        <pc:chgData name="Adrien Osakwe" userId="7a3e290c-eb83-484b-8e3d-d46ef2333477" providerId="ADAL" clId="{ECB69157-50F4-4BCE-8F3E-6963454F02B1}" dt="2025-02-20T15:22:19.143" v="173" actId="6549"/>
         <pc:sldMkLst>
           <pc:docMk/>
           <pc:sldMk cId="742620507" sldId="353"/>
         </pc:sldMkLst>
         <pc:spChg chg="mod">
-          <ac:chgData name="Adrien Osakwe" userId="7a3e290c-eb83-484b-8e3d-d46ef2333477" providerId="ADAL" clId="{ECB69157-50F4-4BCE-8F3E-6963454F02B1}" dt="2025-02-19T15:28:22.529" v="11" actId="27636"/>
+          <ac:chgData name="Adrien Osakwe" userId="7a3e290c-eb83-484b-8e3d-d46ef2333477" providerId="ADAL" clId="{ECB69157-50F4-4BCE-8F3E-6963454F02B1}" dt="2025-02-20T15:22:19.143" v="173" actId="6549"/>
           <ac:spMkLst>
             <pc:docMk/>
             <pc:sldMk cId="742620507" sldId="353"/>
@@ -674,7 +674,7 @@
         </pc:spChg>
       </pc:sldChg>
       <pc:sldChg chg="modSp mod">
-        <pc:chgData name="Adrien Osakwe" userId="7a3e290c-eb83-484b-8e3d-d46ef2333477" providerId="ADAL" clId="{ECB69157-50F4-4BCE-8F3E-6963454F02B1}" dt="2025-02-19T21:20:03.669" v="148" actId="20577"/>
+        <pc:chgData name="Adrien Osakwe" userId="7a3e290c-eb83-484b-8e3d-d46ef2333477" providerId="ADAL" clId="{ECB69157-50F4-4BCE-8F3E-6963454F02B1}" dt="2025-02-20T15:24:11.052" v="221" actId="20577"/>
         <pc:sldMkLst>
           <pc:docMk/>
           <pc:sldMk cId="1189678410" sldId="415"/>
@@ -685,6 +685,14 @@
             <pc:docMk/>
             <pc:sldMk cId="1189678410" sldId="415"/>
             <ac:spMk id="2" creationId="{E961C9E1-74EF-A90A-DC4C-C0F9823CF87A}"/>
+          </ac:spMkLst>
+        </pc:spChg>
+        <pc:spChg chg="mod">
+          <ac:chgData name="Adrien Osakwe" userId="7a3e290c-eb83-484b-8e3d-d46ef2333477" providerId="ADAL" clId="{ECB69157-50F4-4BCE-8F3E-6963454F02B1}" dt="2025-02-20T15:24:11.052" v="221" actId="20577"/>
+          <ac:spMkLst>
+            <pc:docMk/>
+            <pc:sldMk cId="1189678410" sldId="415"/>
+            <ac:spMk id="5" creationId="{B5C65067-8301-83CF-6944-C733754CC10E}"/>
           </ac:spMkLst>
         </pc:spChg>
       </pc:sldChg>
@@ -702,12 +710,35 @@
           <pc:sldMk cId="3783639537" sldId="451"/>
         </pc:sldMkLst>
       </pc:sldChg>
-      <pc:sldChg chg="ord">
-        <pc:chgData name="Adrien Osakwe" userId="7a3e290c-eb83-484b-8e3d-d46ef2333477" providerId="ADAL" clId="{ECB69157-50F4-4BCE-8F3E-6963454F02B1}" dt="2025-02-19T15:28:09.578" v="2"/>
+      <pc:sldChg chg="modSp mod ord modAnim">
+        <pc:chgData name="Adrien Osakwe" userId="7a3e290c-eb83-484b-8e3d-d46ef2333477" providerId="ADAL" clId="{ECB69157-50F4-4BCE-8F3E-6963454F02B1}" dt="2025-02-20T15:33:43.536" v="229"/>
         <pc:sldMkLst>
           <pc:docMk/>
           <pc:sldMk cId="401542667" sldId="455"/>
         </pc:sldMkLst>
+        <pc:spChg chg="mod">
+          <ac:chgData name="Adrien Osakwe" userId="7a3e290c-eb83-484b-8e3d-d46ef2333477" providerId="ADAL" clId="{ECB69157-50F4-4BCE-8F3E-6963454F02B1}" dt="2025-02-20T15:33:07.881" v="224" actId="113"/>
+          <ac:spMkLst>
+            <pc:docMk/>
+            <pc:sldMk cId="401542667" sldId="455"/>
+            <ac:spMk id="3" creationId="{8DB4E871-E104-6882-2745-47F74AF22706}"/>
+          </ac:spMkLst>
+        </pc:spChg>
+      </pc:sldChg>
+      <pc:sldChg chg="modSp">
+        <pc:chgData name="Adrien Osakwe" userId="7a3e290c-eb83-484b-8e3d-d46ef2333477" providerId="ADAL" clId="{ECB69157-50F4-4BCE-8F3E-6963454F02B1}" dt="2025-02-20T17:16:50.767" v="423"/>
+        <pc:sldMkLst>
+          <pc:docMk/>
+          <pc:sldMk cId="3210398204" sldId="456"/>
+        </pc:sldMkLst>
+        <pc:spChg chg="mod">
+          <ac:chgData name="Adrien Osakwe" userId="7a3e290c-eb83-484b-8e3d-d46ef2333477" providerId="ADAL" clId="{ECB69157-50F4-4BCE-8F3E-6963454F02B1}" dt="2025-02-20T17:16:50.767" v="423"/>
+          <ac:spMkLst>
+            <pc:docMk/>
+            <pc:sldMk cId="3210398204" sldId="456"/>
+            <ac:spMk id="4" creationId="{9E790FD7-4718-14B8-CF46-983DA0125014}"/>
+          </ac:spMkLst>
+        </pc:spChg>
       </pc:sldChg>
       <pc:sldChg chg="ord">
         <pc:chgData name="Adrien Osakwe" userId="7a3e290c-eb83-484b-8e3d-d46ef2333477" providerId="ADAL" clId="{ECB69157-50F4-4BCE-8F3E-6963454F02B1}" dt="2025-02-19T15:28:09.578" v="2"/>
@@ -715,6 +746,36 @@
           <pc:docMk/>
           <pc:sldMk cId="1657585528" sldId="457"/>
         </pc:sldMkLst>
+      </pc:sldChg>
+      <pc:sldChg chg="modSp mod">
+        <pc:chgData name="Adrien Osakwe" userId="7a3e290c-eb83-484b-8e3d-d46ef2333477" providerId="ADAL" clId="{ECB69157-50F4-4BCE-8F3E-6963454F02B1}" dt="2025-02-20T16:55:46.819" v="359" actId="20577"/>
+        <pc:sldMkLst>
+          <pc:docMk/>
+          <pc:sldMk cId="1864357679" sldId="460"/>
+        </pc:sldMkLst>
+        <pc:spChg chg="mod">
+          <ac:chgData name="Adrien Osakwe" userId="7a3e290c-eb83-484b-8e3d-d46ef2333477" providerId="ADAL" clId="{ECB69157-50F4-4BCE-8F3E-6963454F02B1}" dt="2025-02-20T16:55:46.819" v="359" actId="20577"/>
+          <ac:spMkLst>
+            <pc:docMk/>
+            <pc:sldMk cId="1864357679" sldId="460"/>
+            <ac:spMk id="3" creationId="{B85FFC6A-938B-0A41-DFA2-95110E417B0B}"/>
+          </ac:spMkLst>
+        </pc:spChg>
+      </pc:sldChg>
+      <pc:sldChg chg="modSp mod">
+        <pc:chgData name="Adrien Osakwe" userId="7a3e290c-eb83-484b-8e3d-d46ef2333477" providerId="ADAL" clId="{ECB69157-50F4-4BCE-8F3E-6963454F02B1}" dt="2025-02-20T16:57:01.105" v="376" actId="27636"/>
+        <pc:sldMkLst>
+          <pc:docMk/>
+          <pc:sldMk cId="3144204626" sldId="462"/>
+        </pc:sldMkLst>
+        <pc:spChg chg="mod">
+          <ac:chgData name="Adrien Osakwe" userId="7a3e290c-eb83-484b-8e3d-d46ef2333477" providerId="ADAL" clId="{ECB69157-50F4-4BCE-8F3E-6963454F02B1}" dt="2025-02-20T16:57:01.105" v="376" actId="27636"/>
+          <ac:spMkLst>
+            <pc:docMk/>
+            <pc:sldMk cId="3144204626" sldId="462"/>
+            <ac:spMk id="3" creationId="{7A07AE36-5E06-9DEF-ECA1-F930F4750B71}"/>
+          </ac:spMkLst>
+        </pc:spChg>
       </pc:sldChg>
       <pc:sldChg chg="modSp mod">
         <pc:chgData name="Adrien Osakwe" userId="7a3e290c-eb83-484b-8e3d-d46ef2333477" providerId="ADAL" clId="{ECB69157-50F4-4BCE-8F3E-6963454F02B1}" dt="2025-02-20T05:18:29.174" v="172" actId="207"/>
@@ -731,12 +792,20 @@
           </ac:spMkLst>
         </pc:spChg>
       </pc:sldChg>
-      <pc:sldChg chg="ord">
-        <pc:chgData name="Adrien Osakwe" userId="7a3e290c-eb83-484b-8e3d-d46ef2333477" providerId="ADAL" clId="{ECB69157-50F4-4BCE-8F3E-6963454F02B1}" dt="2025-02-19T15:28:09.578" v="2"/>
+      <pc:sldChg chg="modSp mod ord modAnim">
+        <pc:chgData name="Adrien Osakwe" userId="7a3e290c-eb83-484b-8e3d-d46ef2333477" providerId="ADAL" clId="{ECB69157-50F4-4BCE-8F3E-6963454F02B1}" dt="2025-02-20T15:36:14.490" v="245" actId="14100"/>
         <pc:sldMkLst>
           <pc:docMk/>
           <pc:sldMk cId="545663224" sldId="465"/>
         </pc:sldMkLst>
+        <pc:spChg chg="mod">
+          <ac:chgData name="Adrien Osakwe" userId="7a3e290c-eb83-484b-8e3d-d46ef2333477" providerId="ADAL" clId="{ECB69157-50F4-4BCE-8F3E-6963454F02B1}" dt="2025-02-20T15:36:14.490" v="245" actId="14100"/>
+          <ac:spMkLst>
+            <pc:docMk/>
+            <pc:sldMk cId="545663224" sldId="465"/>
+            <ac:spMk id="4" creationId="{8B78D07E-1C6C-0831-19C7-1C1A848E098A}"/>
+          </ac:spMkLst>
+        </pc:spChg>
       </pc:sldChg>
       <pc:sldChg chg="ord">
         <pc:chgData name="Adrien Osakwe" userId="7a3e290c-eb83-484b-8e3d-d46ef2333477" providerId="ADAL" clId="{ECB69157-50F4-4BCE-8F3E-6963454F02B1}" dt="2025-02-19T15:28:09.578" v="2"/>
@@ -745,12 +814,28 @@
           <pc:sldMk cId="760899132" sldId="467"/>
         </pc:sldMkLst>
       </pc:sldChg>
-      <pc:sldChg chg="ord">
-        <pc:chgData name="Adrien Osakwe" userId="7a3e290c-eb83-484b-8e3d-d46ef2333477" providerId="ADAL" clId="{ECB69157-50F4-4BCE-8F3E-6963454F02B1}" dt="2025-02-19T15:28:09.578" v="2"/>
+      <pc:sldChg chg="addSp modSp mod ord">
+        <pc:chgData name="Adrien Osakwe" userId="7a3e290c-eb83-484b-8e3d-d46ef2333477" providerId="ADAL" clId="{ECB69157-50F4-4BCE-8F3E-6963454F02B1}" dt="2025-02-20T15:40:39.652" v="350" actId="20577"/>
         <pc:sldMkLst>
           <pc:docMk/>
           <pc:sldMk cId="3319858475" sldId="469"/>
         </pc:sldMkLst>
+        <pc:spChg chg="mod">
+          <ac:chgData name="Adrien Osakwe" userId="7a3e290c-eb83-484b-8e3d-d46ef2333477" providerId="ADAL" clId="{ECB69157-50F4-4BCE-8F3E-6963454F02B1}" dt="2025-02-20T15:40:39.652" v="350" actId="20577"/>
+          <ac:spMkLst>
+            <pc:docMk/>
+            <pc:sldMk cId="3319858475" sldId="469"/>
+            <ac:spMk id="3" creationId="{E94F0D39-2848-DE9F-D2ED-AF4FACF6AC2C}"/>
+          </ac:spMkLst>
+        </pc:spChg>
+        <pc:spChg chg="add mod">
+          <ac:chgData name="Adrien Osakwe" userId="7a3e290c-eb83-484b-8e3d-d46ef2333477" providerId="ADAL" clId="{ECB69157-50F4-4BCE-8F3E-6963454F02B1}" dt="2025-02-20T15:39:51.942" v="269" actId="20577"/>
+          <ac:spMkLst>
+            <pc:docMk/>
+            <pc:sldMk cId="3319858475" sldId="469"/>
+            <ac:spMk id="5" creationId="{BDCC88E7-3802-0EBA-6237-309580EAD2C7}"/>
+          </ac:spMkLst>
+        </pc:spChg>
       </pc:sldChg>
       <pc:sldChg chg="ord">
         <pc:chgData name="Adrien Osakwe" userId="7a3e290c-eb83-484b-8e3d-d46ef2333477" providerId="ADAL" clId="{ECB69157-50F4-4BCE-8F3E-6963454F02B1}" dt="2025-02-19T15:28:09.578" v="2"/>
@@ -758,6 +843,21 @@
           <pc:docMk/>
           <pc:sldMk cId="2039326999" sldId="470"/>
         </pc:sldMkLst>
+      </pc:sldChg>
+      <pc:sldChg chg="modSp modAnim">
+        <pc:chgData name="Adrien Osakwe" userId="7a3e290c-eb83-484b-8e3d-d46ef2333477" providerId="ADAL" clId="{ECB69157-50F4-4BCE-8F3E-6963454F02B1}" dt="2025-02-20T15:32:40.112" v="222" actId="113"/>
+        <pc:sldMkLst>
+          <pc:docMk/>
+          <pc:sldMk cId="1014294434" sldId="472"/>
+        </pc:sldMkLst>
+        <pc:spChg chg="mod">
+          <ac:chgData name="Adrien Osakwe" userId="7a3e290c-eb83-484b-8e3d-d46ef2333477" providerId="ADAL" clId="{ECB69157-50F4-4BCE-8F3E-6963454F02B1}" dt="2025-02-20T15:32:40.112" v="222" actId="113"/>
+          <ac:spMkLst>
+            <pc:docMk/>
+            <pc:sldMk cId="1014294434" sldId="472"/>
+            <ac:spMk id="3" creationId="{16E61E82-8EB2-747B-1ECB-331F155BDCC0}"/>
+          </ac:spMkLst>
+        </pc:spChg>
       </pc:sldChg>
       <pc:sldChg chg="ord">
         <pc:chgData name="Adrien Osakwe" userId="7a3e290c-eb83-484b-8e3d-d46ef2333477" providerId="ADAL" clId="{ECB69157-50F4-4BCE-8F3E-6963454F02B1}" dt="2025-02-19T15:28:09.578" v="2"/>
@@ -782,7 +882,7 @@
         </pc:spChg>
       </pc:sldChg>
       <pc:sldChg chg="modSp mod">
-        <pc:chgData name="Adrien Osakwe" userId="7a3e290c-eb83-484b-8e3d-d46ef2333477" providerId="ADAL" clId="{ECB69157-50F4-4BCE-8F3E-6963454F02B1}" dt="2025-02-20T05:18:26.134" v="171" actId="207"/>
+        <pc:chgData name="Adrien Osakwe" userId="7a3e290c-eb83-484b-8e3d-d46ef2333477" providerId="ADAL" clId="{ECB69157-50F4-4BCE-8F3E-6963454F02B1}" dt="2025-02-20T17:10:03.013" v="409" actId="6549"/>
         <pc:sldMkLst>
           <pc:docMk/>
           <pc:sldMk cId="3592411448" sldId="479"/>
@@ -793,6 +893,14 @@
             <pc:docMk/>
             <pc:sldMk cId="3592411448" sldId="479"/>
             <ac:spMk id="2" creationId="{80FBF824-DBBC-CF0C-4577-3344C88B0281}"/>
+          </ac:spMkLst>
+        </pc:spChg>
+        <pc:spChg chg="mod">
+          <ac:chgData name="Adrien Osakwe" userId="7a3e290c-eb83-484b-8e3d-d46ef2333477" providerId="ADAL" clId="{ECB69157-50F4-4BCE-8F3E-6963454F02B1}" dt="2025-02-20T17:10:03.013" v="409" actId="6549"/>
+          <ac:spMkLst>
+            <pc:docMk/>
+            <pc:sldMk cId="3592411448" sldId="479"/>
+            <ac:spMk id="3" creationId="{9D4A474C-A228-17C2-D611-129C8F2401B9}"/>
           </ac:spMkLst>
         </pc:spChg>
       </pc:sldChg>
@@ -4030,7 +4138,7 @@
               <a:t>Represented as </a:t>
             </a:r>
             <a:r>
-              <a:rPr lang="en-CA" i="1" dirty="0"/>
+              <a:rPr lang="en-CA" b="1" i="1" dirty="0"/>
               <a:t>NA</a:t>
             </a:r>
             <a:r>
@@ -4539,7 +4647,11 @@
             </a:pPr>
             <a:r>
               <a:rPr lang="en-CA" dirty="0"/>
-              <a:t>Follows a normal distribution</a:t>
+              <a:t>Follows </a:t>
+            </a:r>
+            <a:r>
+              <a:rPr lang="en-CA" b="1" dirty="0"/>
+              <a:t>a Normal distribution</a:t>
             </a:r>
           </a:p>
           <a:p>
@@ -5163,7 +5275,7 @@
                             </p:stCondLst>
                             <p:childTnLst>
                               <p:par>
-                                <p:cTn id="5" presetID="1" presetClass="entr" presetSubtype="0" fill="hold" grpId="0" nodeType="clickEffect">
+                                <p:cTn id="5" presetID="1" presetClass="entr" presetSubtype="0" fill="hold" nodeType="clickEffect">
                                   <p:stCondLst>
                                     <p:cond delay="0"/>
                                   </p:stCondLst>
@@ -5176,7 +5288,11 @@
                                           </p:stCondLst>
                                         </p:cTn>
                                         <p:tgtEl>
-                                          <p:spTgt spid="10"/>
+                                          <p:spTgt spid="3">
+                                            <p:txEl>
+                                              <p:pRg st="2" end="2"/>
+                                            </p:txEl>
+                                          </p:spTgt>
                                         </p:tgtEl>
                                         <p:attrNameLst>
                                           <p:attrName>style.visibility</p:attrName>
@@ -5208,7 +5324,7 @@
                             </p:stCondLst>
                             <p:childTnLst>
                               <p:par>
-                                <p:cTn id="9" presetID="1" presetClass="entr" presetSubtype="0" fill="hold" grpId="0" nodeType="clickEffect">
+                                <p:cTn id="9" presetID="1" presetClass="entr" presetSubtype="0" fill="hold" nodeType="clickEffect">
                                   <p:stCondLst>
                                     <p:cond delay="0"/>
                                   </p:stCondLst>
@@ -5221,7 +5337,101 @@
                                           </p:stCondLst>
                                         </p:cTn>
                                         <p:tgtEl>
+                                          <p:spTgt spid="3">
+                                            <p:txEl>
+                                              <p:pRg st="3" end="3"/>
+                                            </p:txEl>
+                                          </p:spTgt>
+                                        </p:tgtEl>
+                                        <p:attrNameLst>
+                                          <p:attrName>style.visibility</p:attrName>
+                                        </p:attrNameLst>
+                                      </p:cBhvr>
+                                      <p:to>
+                                        <p:strVal val="visible"/>
+                                      </p:to>
+                                    </p:set>
+                                  </p:childTnLst>
+                                </p:cTn>
+                              </p:par>
+                            </p:childTnLst>
+                          </p:cTn>
+                        </p:par>
+                      </p:childTnLst>
+                    </p:cTn>
+                  </p:par>
+                  <p:par>
+                    <p:cTn id="11" fill="hold">
+                      <p:stCondLst>
+                        <p:cond delay="indefinite"/>
+                      </p:stCondLst>
+                      <p:childTnLst>
+                        <p:par>
+                          <p:cTn id="12" fill="hold">
+                            <p:stCondLst>
+                              <p:cond delay="0"/>
+                            </p:stCondLst>
+                            <p:childTnLst>
+                              <p:par>
+                                <p:cTn id="13" presetID="1" presetClass="entr" presetSubtype="0" fill="hold" grpId="0" nodeType="clickEffect">
+                                  <p:stCondLst>
+                                    <p:cond delay="0"/>
+                                  </p:stCondLst>
+                                  <p:childTnLst>
+                                    <p:set>
+                                      <p:cBhvr>
+                                        <p:cTn id="14" dur="1" fill="hold">
+                                          <p:stCondLst>
+                                            <p:cond delay="0"/>
+                                          </p:stCondLst>
+                                        </p:cTn>
+                                        <p:tgtEl>
                                           <p:spTgt spid="11"/>
+                                        </p:tgtEl>
+                                        <p:attrNameLst>
+                                          <p:attrName>style.visibility</p:attrName>
+                                        </p:attrNameLst>
+                                      </p:cBhvr>
+                                      <p:to>
+                                        <p:strVal val="visible"/>
+                                      </p:to>
+                                    </p:set>
+                                  </p:childTnLst>
+                                </p:cTn>
+                              </p:par>
+                            </p:childTnLst>
+                          </p:cTn>
+                        </p:par>
+                      </p:childTnLst>
+                    </p:cTn>
+                  </p:par>
+                  <p:par>
+                    <p:cTn id="15" fill="hold">
+                      <p:stCondLst>
+                        <p:cond delay="indefinite"/>
+                      </p:stCondLst>
+                      <p:childTnLst>
+                        <p:par>
+                          <p:cTn id="16" fill="hold">
+                            <p:stCondLst>
+                              <p:cond delay="0"/>
+                            </p:stCondLst>
+                            <p:childTnLst>
+                              <p:par>
+                                <p:cTn id="17" presetID="1" presetClass="entr" presetSubtype="0" fill="hold" grpId="0" nodeType="clickEffect">
+                                  <p:stCondLst>
+                                    <p:cond delay="0"/>
+                                  </p:stCondLst>
+                                  <p:childTnLst>
+                                    <p:set>
+                                      <p:cBhvr>
+                                        <p:cTn id="18" dur="1" fill="hold">
+                                          <p:stCondLst>
+                                            <p:cond delay="0"/>
+                                          </p:stCondLst>
+                                        </p:cTn>
+                                        <p:tgtEl>
+                                          <p:spTgt spid="10"/>
                                         </p:tgtEl>
                                         <p:attrNameLst>
                                           <p:attrName>style.visibility</p:attrName>
@@ -5510,8 +5720,8 @@
           </a:p>
         </p:txBody>
       </p:sp>
-      <mc:AlternateContent xmlns:mc="http://schemas.openxmlformats.org/markup-compatibility/2006" xmlns:a14="http://schemas.microsoft.com/office/drawing/2010/main">
-        <mc:Choice Requires="a14">
+      <mc:AlternateContent xmlns:mc="http://schemas.openxmlformats.org/markup-compatibility/2006">
+        <mc:Choice xmlns:a14="http://schemas.microsoft.com/office/drawing/2010/main" Requires="a14">
           <p:sp>
             <p:nvSpPr>
               <p:cNvPr id="4" name="TextBox 3">
@@ -5527,7 +5737,7 @@
             <p:spPr>
               <a:xfrm>
                 <a:off x="3776485" y="2793334"/>
-                <a:ext cx="3098877" cy="430887"/>
+                <a:ext cx="3484394" cy="430887"/>
               </a:xfrm>
               <a:prstGeom prst="rect">
                 <a:avLst/>
@@ -5540,11 +5750,40 @@
               </a:bodyPr>
               <a:lstStyle/>
               <a:p>
+                <a14:m>
+                  <m:oMath xmlns:m="http://schemas.openxmlformats.org/officeDocument/2006/math">
+                    <m:sSub>
+                      <m:sSubPr>
+                        <m:ctrlPr>
+                          <a:rPr lang="en-CA" sz="2800" i="1" smtClean="0">
+                            <a:latin typeface="Cambria Math" panose="02040503050406030204" pitchFamily="18" charset="0"/>
+                          </a:rPr>
+                        </m:ctrlPr>
+                      </m:sSubPr>
+                      <m:e>
+                        <m:r>
+                          <a:rPr lang="en-CA" sz="2800" b="0" i="1" smtClean="0">
+                            <a:latin typeface="Cambria Math" panose="02040503050406030204" pitchFamily="18" charset="0"/>
+                          </a:rPr>
+                          <m:t>𝑦</m:t>
+                        </m:r>
+                      </m:e>
+                      <m:sub>
+                        <m:r>
+                          <a:rPr lang="en-CA" sz="2800" b="0" i="1" smtClean="0">
+                            <a:latin typeface="Cambria Math" panose="02040503050406030204" pitchFamily="18" charset="0"/>
+                          </a:rPr>
+                          <m:t>𝑖</m:t>
+                        </m:r>
+                      </m:sub>
+                    </m:sSub>
+                  </m:oMath>
+                </a14:m>
                 <a:r>
                   <a:rPr lang="en-CA" sz="2800" i="1" dirty="0">
                     <a:latin typeface="Cambria Math" panose="02040503050406030204" pitchFamily="18" charset="0"/>
                   </a:rPr>
-                  <a:t>y ~ Normal(</a:t>
+                  <a:t> ~ Normal(</a:t>
                 </a:r>
                 <a:r>
                   <a:rPr lang="el-GR" sz="2800" i="1" dirty="0">
@@ -5553,10 +5792,43 @@
                   <a:t>β</a:t>
                 </a:r>
                 <a:r>
+                  <a:rPr lang="en-CA" sz="2800" dirty="0"/>
+                  <a:t> </a:t>
+                </a:r>
+                <a14:m>
+                  <m:oMath xmlns:m="http://schemas.openxmlformats.org/officeDocument/2006/math">
+                    <m:sSub>
+                      <m:sSubPr>
+                        <m:ctrlPr>
+                          <a:rPr lang="en-CA" sz="2800" i="1">
+                            <a:latin typeface="Cambria Math" panose="02040503050406030204" pitchFamily="18" charset="0"/>
+                          </a:rPr>
+                        </m:ctrlPr>
+                      </m:sSubPr>
+                      <m:e>
+                        <m:r>
+                          <a:rPr lang="en-CA" sz="2800" i="1">
+                            <a:latin typeface="Cambria Math" panose="02040503050406030204" pitchFamily="18" charset="0"/>
+                          </a:rPr>
+                          <m:t>𝑥</m:t>
+                        </m:r>
+                      </m:e>
+                      <m:sub>
+                        <m:r>
+                          <a:rPr lang="en-CA" sz="2800" i="1">
+                            <a:latin typeface="Cambria Math" panose="02040503050406030204" pitchFamily="18" charset="0"/>
+                          </a:rPr>
+                          <m:t>𝑖</m:t>
+                        </m:r>
+                      </m:sub>
+                    </m:sSub>
+                  </m:oMath>
+                </a14:m>
+                <a:r>
                   <a:rPr lang="en-CA" sz="2800" i="1" dirty="0">
                     <a:latin typeface="Cambria Math" panose="02040503050406030204" pitchFamily="18" charset="0"/>
                   </a:rPr>
-                  <a:t>x,</a:t>
+                  <a:t>,</a:t>
                 </a:r>
                 <a:r>
                   <a:rPr lang="el-GR" sz="2800" i="1" dirty="0">
@@ -5615,7 +5887,7 @@
             </p:txBody>
           </p:sp>
         </mc:Choice>
-        <mc:Fallback xmlns="">
+        <mc:Fallback>
           <p:sp>
             <p:nvSpPr>
               <p:cNvPr id="4" name="TextBox 3">
@@ -5633,7 +5905,7 @@
             <p:spPr>
               <a:xfrm>
                 <a:off x="3776485" y="2793334"/>
-                <a:ext cx="3098877" cy="430887"/>
+                <a:ext cx="3484394" cy="430887"/>
               </a:xfrm>
               <a:prstGeom prst="rect">
                 <a:avLst/>
@@ -5641,7 +5913,7 @@
               <a:blipFill>
                 <a:blip r:embed="rId2"/>
                 <a:stretch>
-                  <a:fillRect l="-7087" t="-25352" r="-5315" b="-49296"/>
+                  <a:fillRect l="-175" t="-28169" r="-3152" b="-46479"/>
                 </a:stretch>
               </a:blipFill>
             </p:spPr>
@@ -5705,6 +5977,228 @@
                                         </p:cTn>
                                         <p:tgtEl>
                                           <p:spTgt spid="4"/>
+                                        </p:tgtEl>
+                                        <p:attrNameLst>
+                                          <p:attrName>style.visibility</p:attrName>
+                                        </p:attrNameLst>
+                                      </p:cBhvr>
+                                      <p:to>
+                                        <p:strVal val="visible"/>
+                                      </p:to>
+                                    </p:set>
+                                  </p:childTnLst>
+                                </p:cTn>
+                              </p:par>
+                            </p:childTnLst>
+                          </p:cTn>
+                        </p:par>
+                      </p:childTnLst>
+                    </p:cTn>
+                  </p:par>
+                  <p:par>
+                    <p:cTn id="7" fill="hold">
+                      <p:stCondLst>
+                        <p:cond delay="indefinite"/>
+                      </p:stCondLst>
+                      <p:childTnLst>
+                        <p:par>
+                          <p:cTn id="8" fill="hold">
+                            <p:stCondLst>
+                              <p:cond delay="0"/>
+                            </p:stCondLst>
+                            <p:childTnLst>
+                              <p:par>
+                                <p:cTn id="9" presetID="1" presetClass="entr" presetSubtype="0" fill="hold" nodeType="clickEffect">
+                                  <p:stCondLst>
+                                    <p:cond delay="0"/>
+                                  </p:stCondLst>
+                                  <p:childTnLst>
+                                    <p:set>
+                                      <p:cBhvr>
+                                        <p:cTn id="10" dur="1" fill="hold">
+                                          <p:stCondLst>
+                                            <p:cond delay="0"/>
+                                          </p:stCondLst>
+                                        </p:cTn>
+                                        <p:tgtEl>
+                                          <p:spTgt spid="3">
+                                            <p:txEl>
+                                              <p:pRg st="2" end="2"/>
+                                            </p:txEl>
+                                          </p:spTgt>
+                                        </p:tgtEl>
+                                        <p:attrNameLst>
+                                          <p:attrName>style.visibility</p:attrName>
+                                        </p:attrNameLst>
+                                      </p:cBhvr>
+                                      <p:to>
+                                        <p:strVal val="visible"/>
+                                      </p:to>
+                                    </p:set>
+                                  </p:childTnLst>
+                                </p:cTn>
+                              </p:par>
+                            </p:childTnLst>
+                          </p:cTn>
+                        </p:par>
+                      </p:childTnLst>
+                    </p:cTn>
+                  </p:par>
+                  <p:par>
+                    <p:cTn id="11" fill="hold">
+                      <p:stCondLst>
+                        <p:cond delay="indefinite"/>
+                      </p:stCondLst>
+                      <p:childTnLst>
+                        <p:par>
+                          <p:cTn id="12" fill="hold">
+                            <p:stCondLst>
+                              <p:cond delay="0"/>
+                            </p:stCondLst>
+                            <p:childTnLst>
+                              <p:par>
+                                <p:cTn id="13" presetID="1" presetClass="entr" presetSubtype="0" fill="hold" nodeType="clickEffect">
+                                  <p:stCondLst>
+                                    <p:cond delay="0"/>
+                                  </p:stCondLst>
+                                  <p:childTnLst>
+                                    <p:set>
+                                      <p:cBhvr>
+                                        <p:cTn id="14" dur="1" fill="hold">
+                                          <p:stCondLst>
+                                            <p:cond delay="0"/>
+                                          </p:stCondLst>
+                                        </p:cTn>
+                                        <p:tgtEl>
+                                          <p:spTgt spid="3">
+                                            <p:txEl>
+                                              <p:pRg st="3" end="3"/>
+                                            </p:txEl>
+                                          </p:spTgt>
+                                        </p:tgtEl>
+                                        <p:attrNameLst>
+                                          <p:attrName>style.visibility</p:attrName>
+                                        </p:attrNameLst>
+                                      </p:cBhvr>
+                                      <p:to>
+                                        <p:strVal val="visible"/>
+                                      </p:to>
+                                    </p:set>
+                                  </p:childTnLst>
+                                </p:cTn>
+                              </p:par>
+                              <p:par>
+                                <p:cTn id="15" presetID="1" presetClass="entr" presetSubtype="0" fill="hold" nodeType="withEffect">
+                                  <p:stCondLst>
+                                    <p:cond delay="0"/>
+                                  </p:stCondLst>
+                                  <p:childTnLst>
+                                    <p:set>
+                                      <p:cBhvr>
+                                        <p:cTn id="16" dur="1" fill="hold">
+                                          <p:stCondLst>
+                                            <p:cond delay="0"/>
+                                          </p:stCondLst>
+                                        </p:cTn>
+                                        <p:tgtEl>
+                                          <p:spTgt spid="3">
+                                            <p:txEl>
+                                              <p:pRg st="4" end="4"/>
+                                            </p:txEl>
+                                          </p:spTgt>
+                                        </p:tgtEl>
+                                        <p:attrNameLst>
+                                          <p:attrName>style.visibility</p:attrName>
+                                        </p:attrNameLst>
+                                      </p:cBhvr>
+                                      <p:to>
+                                        <p:strVal val="visible"/>
+                                      </p:to>
+                                    </p:set>
+                                  </p:childTnLst>
+                                </p:cTn>
+                              </p:par>
+                              <p:par>
+                                <p:cTn id="17" presetID="1" presetClass="entr" presetSubtype="0" fill="hold" nodeType="withEffect">
+                                  <p:stCondLst>
+                                    <p:cond delay="0"/>
+                                  </p:stCondLst>
+                                  <p:childTnLst>
+                                    <p:set>
+                                      <p:cBhvr>
+                                        <p:cTn id="18" dur="1" fill="hold">
+                                          <p:stCondLst>
+                                            <p:cond delay="0"/>
+                                          </p:stCondLst>
+                                        </p:cTn>
+                                        <p:tgtEl>
+                                          <p:spTgt spid="3">
+                                            <p:txEl>
+                                              <p:pRg st="5" end="5"/>
+                                            </p:txEl>
+                                          </p:spTgt>
+                                        </p:tgtEl>
+                                        <p:attrNameLst>
+                                          <p:attrName>style.visibility</p:attrName>
+                                        </p:attrNameLst>
+                                      </p:cBhvr>
+                                      <p:to>
+                                        <p:strVal val="visible"/>
+                                      </p:to>
+                                    </p:set>
+                                  </p:childTnLst>
+                                </p:cTn>
+                              </p:par>
+                              <p:par>
+                                <p:cTn id="19" presetID="1" presetClass="entr" presetSubtype="0" fill="hold" nodeType="withEffect">
+                                  <p:stCondLst>
+                                    <p:cond delay="0"/>
+                                  </p:stCondLst>
+                                  <p:childTnLst>
+                                    <p:set>
+                                      <p:cBhvr>
+                                        <p:cTn id="20" dur="1" fill="hold">
+                                          <p:stCondLst>
+                                            <p:cond delay="0"/>
+                                          </p:stCondLst>
+                                        </p:cTn>
+                                        <p:tgtEl>
+                                          <p:spTgt spid="3">
+                                            <p:txEl>
+                                              <p:pRg st="6" end="6"/>
+                                            </p:txEl>
+                                          </p:spTgt>
+                                        </p:tgtEl>
+                                        <p:attrNameLst>
+                                          <p:attrName>style.visibility</p:attrName>
+                                        </p:attrNameLst>
+                                      </p:cBhvr>
+                                      <p:to>
+                                        <p:strVal val="visible"/>
+                                      </p:to>
+                                    </p:set>
+                                  </p:childTnLst>
+                                </p:cTn>
+                              </p:par>
+                              <p:par>
+                                <p:cTn id="21" presetID="1" presetClass="entr" presetSubtype="0" fill="hold" nodeType="withEffect">
+                                  <p:stCondLst>
+                                    <p:cond delay="0"/>
+                                  </p:stCondLst>
+                                  <p:childTnLst>
+                                    <p:set>
+                                      <p:cBhvr>
+                                        <p:cTn id="22" dur="1" fill="hold">
+                                          <p:stCondLst>
+                                            <p:cond delay="0"/>
+                                          </p:stCondLst>
+                                        </p:cTn>
+                                        <p:tgtEl>
+                                          <p:spTgt spid="3">
+                                            <p:txEl>
+                                              <p:pRg st="7" end="7"/>
+                                            </p:txEl>
+                                          </p:spTgt>
                                         </p:tgtEl>
                                         <p:attrNameLst>
                                           <p:attrName>style.visibility</p:attrName>
@@ -5820,7 +6314,7 @@
           <a:p>
             <a:r>
               <a:rPr lang="en-CA" dirty="0"/>
-              <a:t>Probability</a:t>
+              <a:t>Probabilistic Approach</a:t>
             </a:r>
           </a:p>
           <a:p>
@@ -5829,7 +6323,7 @@
               <a:buChar char="•"/>
             </a:pPr>
             <a:r>
-              <a:rPr lang="en-CA" dirty="0"/>
+              <a:rPr lang="en-CA" b="1" dirty="0"/>
               <a:t>Maximum Likelihood Estimation</a:t>
             </a:r>
           </a:p>
@@ -6378,6 +6872,279 @@
           </p:sp>
         </mc:Fallback>
       </mc:AlternateContent>
+      <mc:AlternateContent xmlns:mc="http://schemas.openxmlformats.org/markup-compatibility/2006">
+        <mc:Choice xmlns:a14="http://schemas.microsoft.com/office/drawing/2010/main" Requires="a14">
+          <p:sp>
+            <p:nvSpPr>
+              <p:cNvPr id="5" name="TextBox 4">
+                <a:extLst>
+                  <a:ext uri="{FF2B5EF4-FFF2-40B4-BE49-F238E27FC236}">
+                    <a16:creationId xmlns:a16="http://schemas.microsoft.com/office/drawing/2014/main" id="{BDCC88E7-3802-0EBA-6237-309580EAD2C7}"/>
+                  </a:ext>
+                </a:extLst>
+              </p:cNvPr>
+              <p:cNvSpPr txBox="1"/>
+              <p:nvPr/>
+            </p:nvSpPr>
+            <p:spPr>
+              <a:xfrm>
+                <a:off x="5079560" y="2637423"/>
+                <a:ext cx="3435790" cy="550087"/>
+              </a:xfrm>
+              <a:prstGeom prst="rect">
+                <a:avLst/>
+              </a:prstGeom>
+              <a:noFill/>
+            </p:spPr>
+            <p:txBody>
+              <a:bodyPr wrap="square">
+                <a:spAutoFit/>
+              </a:bodyPr>
+              <a:lstStyle/>
+              <a:p>
+                <a14:m>
+                  <m:oMathPara xmlns:m="http://schemas.openxmlformats.org/officeDocument/2006/math">
+                    <m:oMathParaPr>
+                      <m:jc m:val="centerGroup"/>
+                    </m:oMathParaPr>
+                    <m:oMath xmlns:m="http://schemas.openxmlformats.org/officeDocument/2006/math">
+                      <m:func>
+                        <m:funcPr>
+                          <m:ctrlPr>
+                            <a:rPr lang="en-CA" sz="1800" i="1" smtClean="0">
+                              <a:latin typeface="Cambria Math" panose="02040503050406030204" pitchFamily="18" charset="0"/>
+                            </a:rPr>
+                          </m:ctrlPr>
+                        </m:funcPr>
+                        <m:fName>
+                          <m:limLow>
+                            <m:limLowPr>
+                              <m:ctrlPr>
+                                <a:rPr lang="en-CA" sz="1800" i="1" smtClean="0">
+                                  <a:latin typeface="Cambria Math" panose="02040503050406030204" pitchFamily="18" charset="0"/>
+                                </a:rPr>
+                              </m:ctrlPr>
+                            </m:limLowPr>
+                            <m:e>
+                              <m:r>
+                                <m:rPr>
+                                  <m:sty m:val="p"/>
+                                </m:rPr>
+                                <a:rPr lang="en-CA" sz="1800" b="0" i="0" smtClean="0">
+                                  <a:latin typeface="Cambria Math" panose="02040503050406030204" pitchFamily="18" charset="0"/>
+                                </a:rPr>
+                                <m:t>arg</m:t>
+                              </m:r>
+                              <m:r>
+                                <m:rPr>
+                                  <m:sty m:val="p"/>
+                                </m:rPr>
+                                <a:rPr lang="en-CA" sz="1800" b="0" i="0" smtClean="0">
+                                  <a:latin typeface="Cambria Math" panose="02040503050406030204" pitchFamily="18" charset="0"/>
+                                </a:rPr>
+                                <m:t>max</m:t>
+                              </m:r>
+                            </m:e>
+                            <m:lim>
+                              <m:r>
+                                <a:rPr lang="en-CA" sz="1800" b="0" i="1">
+                                  <a:latin typeface="Cambria Math" panose="02040503050406030204" pitchFamily="18" charset="0"/>
+                                  <a:ea typeface="Cambria Math" panose="02040503050406030204" pitchFamily="18" charset="0"/>
+                                </a:rPr>
+                                <m:t>𝛽</m:t>
+                              </m:r>
+                            </m:lim>
+                          </m:limLow>
+                        </m:fName>
+                        <m:e>
+                          <m:r>
+                            <m:rPr>
+                              <m:nor/>
+                            </m:rPr>
+                            <a:rPr lang="en-CA" sz="1800" b="0" i="1" smtClean="0">
+                              <a:latin typeface="Cambria Math" panose="02040503050406030204" pitchFamily="18" charset="0"/>
+                            </a:rPr>
+                            <m:t> </m:t>
+                          </m:r>
+                          <m:r>
+                            <m:rPr>
+                              <m:nor/>
+                            </m:rPr>
+                            <a:rPr lang="en-CA" sz="1800" i="1" smtClean="0">
+                              <a:latin typeface="Cambria Math" panose="02040503050406030204" pitchFamily="18" charset="0"/>
+                            </a:rPr>
+                            <m:t>log</m:t>
+                          </m:r>
+                          <m:r>
+                            <m:rPr>
+                              <m:nor/>
+                            </m:rPr>
+                            <a:rPr lang="en-CA" sz="1800" i="1" smtClean="0">
+                              <a:latin typeface="Cambria Math" panose="02040503050406030204" pitchFamily="18" charset="0"/>
+                            </a:rPr>
+                            <m:t>(</m:t>
+                          </m:r>
+                          <m:r>
+                            <m:rPr>
+                              <m:nor/>
+                            </m:rPr>
+                            <a:rPr lang="en-CA" sz="1800" i="1" dirty="0">
+                              <a:latin typeface="Cambria Math" panose="02040503050406030204" pitchFamily="18" charset="0"/>
+                            </a:rPr>
+                            <m:t>Normal</m:t>
+                          </m:r>
+                          <m:r>
+                            <m:rPr>
+                              <m:nor/>
+                            </m:rPr>
+                            <a:rPr lang="en-CA" sz="1800" i="1" dirty="0">
+                              <a:latin typeface="Cambria Math" panose="02040503050406030204" pitchFamily="18" charset="0"/>
+                            </a:rPr>
+                            <m:t>(</m:t>
+                          </m:r>
+                          <m:r>
+                            <m:rPr>
+                              <m:nor/>
+                            </m:rPr>
+                            <a:rPr lang="el-GR" sz="1800" i="1" dirty="0">
+                              <a:latin typeface="Cambria Math" panose="02040503050406030204" pitchFamily="18" charset="0"/>
+                            </a:rPr>
+                            <m:t>β</m:t>
+                          </m:r>
+                          <m:r>
+                            <m:rPr>
+                              <m:nor/>
+                            </m:rPr>
+                            <a:rPr lang="en-CA" sz="1800" i="1" dirty="0">
+                              <a:latin typeface="Cambria Math" panose="02040503050406030204" pitchFamily="18" charset="0"/>
+                            </a:rPr>
+                            <m:t>x</m:t>
+                          </m:r>
+                          <m:r>
+                            <m:rPr>
+                              <m:nor/>
+                            </m:rPr>
+                            <a:rPr lang="en-CA" sz="1800" i="1" dirty="0">
+                              <a:latin typeface="Cambria Math" panose="02040503050406030204" pitchFamily="18" charset="0"/>
+                            </a:rPr>
+                            <m:t>,</m:t>
+                          </m:r>
+                          <m:r>
+                            <m:rPr>
+                              <m:nor/>
+                            </m:rPr>
+                            <a:rPr lang="el-GR" sz="1800" i="1" dirty="0">
+                              <a:latin typeface="Cambria Math" panose="02040503050406030204" pitchFamily="18" charset="0"/>
+                            </a:rPr>
+                            <m:t> </m:t>
+                          </m:r>
+                          <m:sSup>
+                            <m:sSupPr>
+                              <m:ctrlPr>
+                                <a:rPr lang="pt-BR" sz="1800" i="1">
+                                  <a:latin typeface="Cambria Math" panose="02040503050406030204" pitchFamily="18" charset="0"/>
+                                </a:rPr>
+                              </m:ctrlPr>
+                            </m:sSupPr>
+                            <m:e>
+                              <m:r>
+                                <m:rPr>
+                                  <m:nor/>
+                                </m:rPr>
+                                <a:rPr lang="el-GR" sz="1800" i="1" dirty="0">
+                                  <a:latin typeface="Cambria Math" panose="02040503050406030204" pitchFamily="18" charset="0"/>
+                                </a:rPr>
+                                <m:t>σ</m:t>
+                              </m:r>
+                            </m:e>
+                            <m:sup>
+                              <m:r>
+                                <a:rPr lang="en-CA" sz="1800" b="0" i="1">
+                                  <a:latin typeface="Cambria Math" panose="02040503050406030204" pitchFamily="18" charset="0"/>
+                                </a:rPr>
+                                <m:t> </m:t>
+                              </m:r>
+                              <m:r>
+                                <a:rPr lang="pt-BR" sz="1800" b="0" i="1">
+                                  <a:latin typeface="Cambria Math" panose="02040503050406030204" pitchFamily="18" charset="0"/>
+                                </a:rPr>
+                                <m:t>2</m:t>
+                              </m:r>
+                            </m:sup>
+                          </m:sSup>
+                          <m:r>
+                            <m:rPr>
+                              <m:nor/>
+                            </m:rPr>
+                            <a:rPr lang="en-CA" sz="1800" i="1" dirty="0">
+                              <a:latin typeface="Cambria Math" panose="02040503050406030204" pitchFamily="18" charset="0"/>
+                            </a:rPr>
+                            <m:t>)</m:t>
+                          </m:r>
+                          <m:r>
+                            <m:rPr>
+                              <m:nor/>
+                            </m:rPr>
+                            <a:rPr lang="en-CA" sz="1800" i="1" dirty="0" smtClean="0">
+                              <a:latin typeface="Cambria Math" panose="02040503050406030204" pitchFamily="18" charset="0"/>
+                            </a:rPr>
+                            <m:t>)</m:t>
+                          </m:r>
+                        </m:e>
+                      </m:func>
+                    </m:oMath>
+                  </m:oMathPara>
+                </a14:m>
+                <a:endParaRPr lang="en-US" dirty="0"/>
+              </a:p>
+            </p:txBody>
+          </p:sp>
+        </mc:Choice>
+        <mc:Fallback>
+          <p:sp>
+            <p:nvSpPr>
+              <p:cNvPr id="5" name="TextBox 4">
+                <a:extLst>
+                  <a:ext uri="{FF2B5EF4-FFF2-40B4-BE49-F238E27FC236}">
+                    <a16:creationId xmlns:a16="http://schemas.microsoft.com/office/drawing/2014/main" id="{BDCC88E7-3802-0EBA-6237-309580EAD2C7}"/>
+                  </a:ext>
+                </a:extLst>
+              </p:cNvPr>
+              <p:cNvSpPr txBox="1">
+                <a:spLocks noRot="1" noChangeAspect="1" noMove="1" noResize="1" noEditPoints="1" noAdjustHandles="1" noChangeArrowheads="1" noChangeShapeType="1" noTextEdit="1"/>
+              </p:cNvSpPr>
+              <p:nvPr/>
+            </p:nvSpPr>
+            <p:spPr>
+              <a:xfrm>
+                <a:off x="5079560" y="2637423"/>
+                <a:ext cx="3435790" cy="550087"/>
+              </a:xfrm>
+              <a:prstGeom prst="rect">
+                <a:avLst/>
+              </a:prstGeom>
+              <a:blipFill>
+                <a:blip r:embed="rId5"/>
+                <a:stretch>
+                  <a:fillRect b="-5556"/>
+                </a:stretch>
+              </a:blipFill>
+            </p:spPr>
+            <p:txBody>
+              <a:bodyPr/>
+              <a:lstStyle/>
+              <a:p>
+                <a:r>
+                  <a:rPr lang="en-US">
+                    <a:noFill/>
+                  </a:rPr>
+                  <a:t> </a:t>
+                </a:r>
+              </a:p>
+            </p:txBody>
+          </p:sp>
+        </mc:Fallback>
+      </mc:AlternateContent>
     </p:spTree>
     <p:extLst>
       <p:ext uri="{BB962C8B-B14F-4D97-AF65-F5344CB8AC3E}">
@@ -7687,7 +8454,7 @@
             </a:r>
             <a:r>
               <a:rPr lang="en-CA" b="1" dirty="0"/>
-              <a:t>makes an assumption on the data distribution</a:t>
+              <a:t>make assumptions on the data distribution</a:t>
             </a:r>
           </a:p>
           <a:p>
@@ -7721,7 +8488,7 @@
             </a:r>
             <a:r>
               <a:rPr lang="en-CA" b="1" dirty="0"/>
-              <a:t>does not make an assumption on data dist.</a:t>
+              <a:t>does not make assumptions on data dist.</a:t>
             </a:r>
             <a:endParaRPr lang="en-CA" dirty="0"/>
           </a:p>
@@ -8254,8 +9021,8 @@
           </a:p>
         </p:txBody>
       </p:sp>
-      <mc:AlternateContent xmlns:mc="http://schemas.openxmlformats.org/markup-compatibility/2006" xmlns:a14="http://schemas.microsoft.com/office/drawing/2010/main">
-        <mc:Choice Requires="a14">
+      <mc:AlternateContent xmlns:mc="http://schemas.openxmlformats.org/markup-compatibility/2006">
+        <mc:Choice xmlns:a14="http://schemas.microsoft.com/office/drawing/2010/main" Requires="a14">
           <p:sp>
             <p:nvSpPr>
               <p:cNvPr id="4" name="TextBox 3">
@@ -8271,7 +9038,7 @@
             <p:spPr>
               <a:xfrm>
                 <a:off x="793371" y="5172415"/>
-                <a:ext cx="2783134" cy="766877"/>
+                <a:ext cx="1443087" cy="766877"/>
               </a:xfrm>
               <a:prstGeom prst="rect">
                 <a:avLst/>
@@ -8301,7 +9068,7 @@
                         <a:rPr lang="en-CA" sz="2400" b="0" i="1" smtClean="0">
                           <a:latin typeface="Cambria Math" panose="02040503050406030204" pitchFamily="18" charset="0"/>
                         </a:rPr>
-                        <m:t>= </m:t>
+                        <m:t>=</m:t>
                       </m:r>
                       <m:f>
                         <m:fPr>
@@ -8319,47 +9086,16 @@
                             <m:t>𝛽</m:t>
                           </m:r>
                           <m:r>
-                            <a:rPr lang="en-CA" sz="2400" b="0" i="1" smtClean="0">
+                            <a:rPr lang="en-CA" sz="2400" i="1">
                               <a:latin typeface="Cambria Math" panose="02040503050406030204" pitchFamily="18" charset="0"/>
                             </a:rPr>
-                            <m:t> −</m:t>
+                            <m:t>−</m:t>
                           </m:r>
                           <m:r>
-                            <a:rPr lang="en-CA" sz="2400" b="0" i="1" smtClean="0">
+                            <a:rPr lang="en-CA" sz="2400" i="1">
                               <a:latin typeface="Cambria Math" panose="02040503050406030204" pitchFamily="18" charset="0"/>
                             </a:rPr>
                             <m:t>𝜇</m:t>
-                          </m:r>
-                        </m:num>
-                        <m:den>
-                          <m:r>
-                            <a:rPr lang="en-CA" sz="2400" b="0" i="1" smtClean="0">
-                              <a:latin typeface="Cambria Math" panose="02040503050406030204" pitchFamily="18" charset="0"/>
-                            </a:rPr>
-                            <m:t>𝜎</m:t>
-                          </m:r>
-                        </m:den>
-                      </m:f>
-                      <m:r>
-                        <a:rPr lang="en-CA" sz="2400" b="0" i="1" smtClean="0">
-                          <a:latin typeface="Cambria Math" panose="02040503050406030204" pitchFamily="18" charset="0"/>
-                        </a:rPr>
-                        <m:t>= </m:t>
-                      </m:r>
-                      <m:f>
-                        <m:fPr>
-                          <m:ctrlPr>
-                            <a:rPr lang="en-CA" sz="2400" b="0" i="1" smtClean="0">
-                              <a:latin typeface="Cambria Math" panose="02040503050406030204" pitchFamily="18" charset="0"/>
-                            </a:rPr>
-                          </m:ctrlPr>
-                        </m:fPr>
-                        <m:num>
-                          <m:r>
-                            <a:rPr lang="en-CA" sz="2400" b="0" i="1" smtClean="0">
-                              <a:latin typeface="Cambria Math" panose="02040503050406030204" pitchFamily="18" charset="0"/>
-                            </a:rPr>
-                            <m:t>𝛽</m:t>
                           </m:r>
                         </m:num>
                         <m:den>
@@ -8397,7 +9133,7 @@
             </p:txBody>
           </p:sp>
         </mc:Choice>
-        <mc:Fallback xmlns="">
+        <mc:Fallback>
           <p:sp>
             <p:nvSpPr>
               <p:cNvPr id="4" name="TextBox 3">
@@ -8415,7 +9151,7 @@
             <p:spPr>
               <a:xfrm>
                 <a:off x="793371" y="5172415"/>
-                <a:ext cx="2783134" cy="766877"/>
+                <a:ext cx="1443087" cy="766877"/>
               </a:xfrm>
               <a:prstGeom prst="rect">
                 <a:avLst/>
@@ -8501,8 +9237,8 @@
           </a:p>
         </p:txBody>
       </p:sp>
-      <mc:AlternateContent xmlns:mc="http://schemas.openxmlformats.org/markup-compatibility/2006" xmlns:a14="http://schemas.microsoft.com/office/drawing/2010/main">
-        <mc:Choice Requires="a14">
+      <mc:AlternateContent xmlns:mc="http://schemas.openxmlformats.org/markup-compatibility/2006">
+        <mc:Choice xmlns:a14="http://schemas.microsoft.com/office/drawing/2010/main" Requires="a14">
           <p:sp>
             <p:nvSpPr>
               <p:cNvPr id="3" name="Text Placeholder 2">
@@ -8521,13 +9257,13 @@
             </p:nvSpPr>
             <p:spPr>
               <a:xfrm>
-                <a:off x="562341" y="2243015"/>
-                <a:ext cx="4391624" cy="3871182"/>
+                <a:off x="118766" y="2243015"/>
+                <a:ext cx="4835199" cy="3871182"/>
               </a:xfrm>
             </p:spPr>
             <p:txBody>
               <a:bodyPr>
-                <a:normAutofit fontScale="92500" lnSpcReduction="20000"/>
+                <a:normAutofit fontScale="92500" lnSpcReduction="10000"/>
               </a:bodyPr>
               <a:lstStyle/>
               <a:p>
@@ -8705,7 +9441,7 @@
                       <a:schemeClr val="tx1"/>
                     </a:solidFill>
                   </a:rPr>
-                  <a:t>One-Sample</a:t>
+                  <a:t>One-Sample - 0</a:t>
                 </a:r>
               </a:p>
               <a:p>
@@ -8719,13 +9455,47 @@
                       <a:schemeClr val="tx1"/>
                     </a:solidFill>
                   </a:rPr>
-                  <a:t>Two-sample</a:t>
+                  <a:t>Two-sample - </a:t>
                 </a:r>
+                <a14:m>
+                  <m:oMath xmlns:m="http://schemas.openxmlformats.org/officeDocument/2006/math">
+                    <m:sSub>
+                      <m:sSubPr>
+                        <m:ctrlPr>
+                          <a:rPr lang="en-CA" sz="2000" b="0" i="1" smtClean="0">
+                            <a:latin typeface="Cambria Math" panose="02040503050406030204" pitchFamily="18" charset="0"/>
+                          </a:rPr>
+                        </m:ctrlPr>
+                      </m:sSubPr>
+                      <m:e>
+                        <m:r>
+                          <a:rPr lang="en-CA" sz="2000" i="1">
+                            <a:latin typeface="Cambria Math" panose="02040503050406030204" pitchFamily="18" charset="0"/>
+                          </a:rPr>
+                          <m:t>𝜇</m:t>
+                        </m:r>
+                      </m:e>
+                      <m:sub>
+                        <m:r>
+                          <a:rPr lang="en-CA" sz="2000" b="0" i="1" smtClean="0">
+                            <a:latin typeface="Cambria Math" panose="02040503050406030204" pitchFamily="18" charset="0"/>
+                          </a:rPr>
+                          <m:t>2</m:t>
+                        </m:r>
+                      </m:sub>
+                    </m:sSub>
+                  </m:oMath>
+                </a14:m>
+                <a:endParaRPr lang="en-US" dirty="0">
+                  <a:solidFill>
+                    <a:schemeClr val="tx1"/>
+                  </a:solidFill>
+                </a:endParaRPr>
               </a:p>
             </p:txBody>
           </p:sp>
         </mc:Choice>
-        <mc:Fallback xmlns="">
+        <mc:Fallback>
           <p:sp>
             <p:nvSpPr>
               <p:cNvPr id="3" name="Text Placeholder 2">
@@ -8744,13 +9514,13 @@
             </p:nvSpPr>
             <p:spPr>
               <a:xfrm>
-                <a:off x="562341" y="2243015"/>
-                <a:ext cx="4391624" cy="3871182"/>
+                <a:off x="118766" y="2243015"/>
+                <a:ext cx="4835199" cy="3871182"/>
               </a:xfrm>
               <a:blipFill>
                 <a:blip r:embed="rId2"/>
                 <a:stretch>
-                  <a:fillRect l="-1803" t="-3307" b="-472"/>
+                  <a:fillRect l="-1637" t="-2677"/>
                 </a:stretch>
               </a:blipFill>
             </p:spPr>
@@ -9342,8 +10112,8 @@
           </a:p>
         </p:txBody>
       </p:sp>
-      <mc:AlternateContent xmlns:mc="http://schemas.openxmlformats.org/markup-compatibility/2006" xmlns:a14="http://schemas.microsoft.com/office/drawing/2010/main">
-        <mc:Choice Requires="a14">
+      <mc:AlternateContent xmlns:mc="http://schemas.openxmlformats.org/markup-compatibility/2006">
+        <mc:Choice xmlns:a14="http://schemas.microsoft.com/office/drawing/2010/main" Requires="a14">
           <p:sp>
             <p:nvSpPr>
               <p:cNvPr id="3" name="Text Placeholder 2">
@@ -9607,7 +10377,7 @@
               <a:p>
                 <a:r>
                   <a:rPr lang="en-US" dirty="0"/>
-                  <a:t>Take the ratio of the variance between treatments over the variance within treatments</a:t>
+                  <a:t>Take the ratio of the variance (mean sum of squares) between treatments over the variance within treatments</a:t>
                 </a:r>
               </a:p>
               <a:p>
@@ -9619,7 +10389,7 @@
             </p:txBody>
           </p:sp>
         </mc:Choice>
-        <mc:Fallback xmlns="">
+        <mc:Fallback>
           <p:sp>
             <p:nvSpPr>
               <p:cNvPr id="3" name="Text Placeholder 2">
@@ -9644,7 +10414,7 @@
               <a:blipFill>
                 <a:blip r:embed="rId2"/>
                 <a:stretch>
-                  <a:fillRect l="-1159" t="-2131"/>
+                  <a:fillRect l="-1159" t="-2131" r="-1391"/>
                 </a:stretch>
               </a:blipFill>
             </p:spPr>
@@ -13553,7 +14323,7 @@
                 <a:ea typeface="Arial" panose="020B0604020202020204" pitchFamily="34" charset="0"/>
                 <a:cs typeface="Helvetica" pitchFamily="2" charset="0"/>
               </a:rPr>
-              <a:t>Data Manipulation/Wrangling</a:t>
+              <a:t>Data Wrangling</a:t>
             </a:r>
           </a:p>
           <a:p>
@@ -13855,7 +14625,7 @@
             </a:pPr>
             <a:r>
               <a:rPr lang="en-US" dirty="0"/>
-              <a:t>Implement functions from other external packages</a:t>
+              <a:t>Examples for how to deal with missing data</a:t>
             </a:r>
           </a:p>
           <a:p>

</xml_diff>

<commit_message>
Adding attendance QR code
</commit_message>
<xml_diff>
--- a/slides/QLS-MiCM_StatisticsInR.pptx
+++ b/slides/QLS-MiCM_StatisticsInR.pptx
@@ -164,7 +164,7 @@
 <file path=ppt/revisionInfo.xml><?xml version="1.0" encoding="utf-8"?>
 <p1510:revInfo xmlns:a="http://schemas.openxmlformats.org/drawingml/2006/main" xmlns:r="http://schemas.openxmlformats.org/officeDocument/2006/relationships" xmlns:p1510="http://schemas.microsoft.com/office/powerpoint/2015/10/main">
   <p1510:revLst>
-    <p1510:client id="{ECB69157-50F4-4BCE-8F3E-6963454F02B1}" v="64" dt="2025-02-20T17:16:50.767"/>
+    <p1510:client id="{D4A007D3-4E97-4B75-95D0-8B1C64C79F43}" v="7" dt="2025-07-13T15:58:18.691"/>
   </p1510:revLst>
 </p1510:revInfo>
 </file>
@@ -559,6 +559,107 @@
     </pc:docChg>
   </pc:docChgLst>
   <pc:docChgLst>
+    <pc:chgData name="Adrien Osakwe" userId="7a3e290c-eb83-484b-8e3d-d46ef2333477" providerId="ADAL" clId="{D4A007D3-4E97-4B75-95D0-8B1C64C79F43}"/>
+    <pc:docChg chg="custSel modSld">
+      <pc:chgData name="Adrien Osakwe" userId="7a3e290c-eb83-484b-8e3d-d46ef2333477" providerId="ADAL" clId="{D4A007D3-4E97-4B75-95D0-8B1C64C79F43}" dt="2025-07-13T15:59:41.536" v="56" actId="1076"/>
+      <pc:docMkLst>
+        <pc:docMk/>
+      </pc:docMkLst>
+      <pc:sldChg chg="modSp mod">
+        <pc:chgData name="Adrien Osakwe" userId="7a3e290c-eb83-484b-8e3d-d46ef2333477" providerId="ADAL" clId="{D4A007D3-4E97-4B75-95D0-8B1C64C79F43}" dt="2025-07-13T15:58:49.210" v="50" actId="20577"/>
+        <pc:sldMkLst>
+          <pc:docMk/>
+          <pc:sldMk cId="2389275097" sldId="316"/>
+        </pc:sldMkLst>
+        <pc:spChg chg="mod">
+          <ac:chgData name="Adrien Osakwe" userId="7a3e290c-eb83-484b-8e3d-d46ef2333477" providerId="ADAL" clId="{D4A007D3-4E97-4B75-95D0-8B1C64C79F43}" dt="2025-07-13T15:58:49.210" v="50" actId="20577"/>
+          <ac:spMkLst>
+            <pc:docMk/>
+            <pc:sldMk cId="2389275097" sldId="316"/>
+            <ac:spMk id="2" creationId="{E57E6C04-4051-B883-0FFD-0C104B795BCE}"/>
+          </ac:spMkLst>
+        </pc:spChg>
+      </pc:sldChg>
+      <pc:sldChg chg="addSp delSp modSp mod">
+        <pc:chgData name="Adrien Osakwe" userId="7a3e290c-eb83-484b-8e3d-d46ef2333477" providerId="ADAL" clId="{D4A007D3-4E97-4B75-95D0-8B1C64C79F43}" dt="2025-07-13T15:57:41.585" v="15" actId="1076"/>
+        <pc:sldMkLst>
+          <pc:docMk/>
+          <pc:sldMk cId="25426801" sldId="318"/>
+        </pc:sldMkLst>
+        <pc:spChg chg="add del">
+          <ac:chgData name="Adrien Osakwe" userId="7a3e290c-eb83-484b-8e3d-d46ef2333477" providerId="ADAL" clId="{D4A007D3-4E97-4B75-95D0-8B1C64C79F43}" dt="2025-07-13T15:56:28.308" v="2" actId="478"/>
+          <ac:spMkLst>
+            <pc:docMk/>
+            <pc:sldMk cId="25426801" sldId="318"/>
+            <ac:spMk id="3" creationId="{7710DF1F-7E9B-BAEB-0219-3FE3E99E5556}"/>
+          </ac:spMkLst>
+        </pc:spChg>
+        <pc:spChg chg="add del mod">
+          <ac:chgData name="Adrien Osakwe" userId="7a3e290c-eb83-484b-8e3d-d46ef2333477" providerId="ADAL" clId="{D4A007D3-4E97-4B75-95D0-8B1C64C79F43}" dt="2025-07-13T15:57:22.204" v="4" actId="478"/>
+          <ac:spMkLst>
+            <pc:docMk/>
+            <pc:sldMk cId="25426801" sldId="318"/>
+            <ac:spMk id="5" creationId="{04653E2A-F453-98D7-FC1C-D61B4A04B9EE}"/>
+          </ac:spMkLst>
+        </pc:spChg>
+        <pc:picChg chg="del">
+          <ac:chgData name="Adrien Osakwe" userId="7a3e290c-eb83-484b-8e3d-d46ef2333477" providerId="ADAL" clId="{D4A007D3-4E97-4B75-95D0-8B1C64C79F43}" dt="2025-07-13T15:56:24.301" v="0" actId="478"/>
+          <ac:picMkLst>
+            <pc:docMk/>
+            <pc:sldMk cId="25426801" sldId="318"/>
+            <ac:picMk id="8" creationId="{A26D50DA-518D-0AF2-D362-2940796A3E8A}"/>
+          </ac:picMkLst>
+        </pc:picChg>
+        <pc:picChg chg="add mod">
+          <ac:chgData name="Adrien Osakwe" userId="7a3e290c-eb83-484b-8e3d-d46ef2333477" providerId="ADAL" clId="{D4A007D3-4E97-4B75-95D0-8B1C64C79F43}" dt="2025-07-13T15:57:41.585" v="15" actId="1076"/>
+          <ac:picMkLst>
+            <pc:docMk/>
+            <pc:sldMk cId="25426801" sldId="318"/>
+            <ac:picMk id="13" creationId="{6DF5BB46-1153-E294-A4F1-5DF7C89C4F2C}"/>
+          </ac:picMkLst>
+        </pc:picChg>
+      </pc:sldChg>
+      <pc:sldChg chg="addSp delSp modSp mod">
+        <pc:chgData name="Adrien Osakwe" userId="7a3e290c-eb83-484b-8e3d-d46ef2333477" providerId="ADAL" clId="{D4A007D3-4E97-4B75-95D0-8B1C64C79F43}" dt="2025-07-13T15:59:41.536" v="56" actId="1076"/>
+        <pc:sldMkLst>
+          <pc:docMk/>
+          <pc:sldMk cId="3301951615" sldId="338"/>
+        </pc:sldMkLst>
+        <pc:picChg chg="add mod">
+          <ac:chgData name="Adrien Osakwe" userId="7a3e290c-eb83-484b-8e3d-d46ef2333477" providerId="ADAL" clId="{D4A007D3-4E97-4B75-95D0-8B1C64C79F43}" dt="2025-07-13T15:59:41.536" v="56" actId="1076"/>
+          <ac:picMkLst>
+            <pc:docMk/>
+            <pc:sldMk cId="3301951615" sldId="338"/>
+            <ac:picMk id="3" creationId="{144E657E-4DB2-77E6-0E22-D9223E12F50D}"/>
+          </ac:picMkLst>
+        </pc:picChg>
+        <pc:picChg chg="del">
+          <ac:chgData name="Adrien Osakwe" userId="7a3e290c-eb83-484b-8e3d-d46ef2333477" providerId="ADAL" clId="{D4A007D3-4E97-4B75-95D0-8B1C64C79F43}" dt="2025-07-13T15:59:07.324" v="51" actId="478"/>
+          <ac:picMkLst>
+            <pc:docMk/>
+            <pc:sldMk cId="3301951615" sldId="338"/>
+            <ac:picMk id="5" creationId="{19B22BFB-B19D-2D0C-A86A-B8456CFB8D45}"/>
+          </ac:picMkLst>
+        </pc:picChg>
+      </pc:sldChg>
+      <pc:sldChg chg="modSp mod">
+        <pc:chgData name="Adrien Osakwe" userId="7a3e290c-eb83-484b-8e3d-d46ef2333477" providerId="ADAL" clId="{D4A007D3-4E97-4B75-95D0-8B1C64C79F43}" dt="2025-07-13T15:58:18.607" v="18" actId="20577"/>
+        <pc:sldMkLst>
+          <pc:docMk/>
+          <pc:sldMk cId="3856371583" sldId="482"/>
+        </pc:sldMkLst>
+        <pc:spChg chg="mod">
+          <ac:chgData name="Adrien Osakwe" userId="7a3e290c-eb83-484b-8e3d-d46ef2333477" providerId="ADAL" clId="{D4A007D3-4E97-4B75-95D0-8B1C64C79F43}" dt="2025-07-13T15:58:18.607" v="18" actId="20577"/>
+          <ac:spMkLst>
+            <pc:docMk/>
+            <pc:sldMk cId="3856371583" sldId="482"/>
+            <ac:spMk id="2" creationId="{845BB119-6782-CBD8-8DCB-F8C750D639F4}"/>
+          </ac:spMkLst>
+        </pc:spChg>
+      </pc:sldChg>
+    </pc:docChg>
+  </pc:docChgLst>
+  <pc:docChgLst>
     <pc:chgData name="Adrien Osakwe" userId="7a3e290c-eb83-484b-8e3d-d46ef2333477" providerId="ADAL" clId="{ECB69157-50F4-4BCE-8F3E-6963454F02B1}"/>
     <pc:docChg chg="custSel addSld delSld modSld sldOrd">
       <pc:chgData name="Adrien Osakwe" userId="7a3e290c-eb83-484b-8e3d-d46ef2333477" providerId="ADAL" clId="{ECB69157-50F4-4BCE-8F3E-6963454F02B1}" dt="2025-02-20T17:16:50.767" v="423"/>
@@ -571,30 +672,6 @@
           <pc:docMk/>
           <pc:sldMk cId="2389275097" sldId="316"/>
         </pc:sldMkLst>
-        <pc:spChg chg="mod">
-          <ac:chgData name="Adrien Osakwe" userId="7a3e290c-eb83-484b-8e3d-d46ef2333477" providerId="ADAL" clId="{ECB69157-50F4-4BCE-8F3E-6963454F02B1}" dt="2025-02-19T21:16:11.328" v="111" actId="1035"/>
-          <ac:spMkLst>
-            <pc:docMk/>
-            <pc:sldMk cId="2389275097" sldId="316"/>
-            <ac:spMk id="2" creationId="{E57E6C04-4051-B883-0FFD-0C104B795BCE}"/>
-          </ac:spMkLst>
-        </pc:spChg>
-        <pc:spChg chg="add mod">
-          <ac:chgData name="Adrien Osakwe" userId="7a3e290c-eb83-484b-8e3d-d46ef2333477" providerId="ADAL" clId="{ECB69157-50F4-4BCE-8F3E-6963454F02B1}" dt="2025-02-19T15:30:12.765" v="57"/>
-          <ac:spMkLst>
-            <pc:docMk/>
-            <pc:sldMk cId="2389275097" sldId="316"/>
-            <ac:spMk id="3" creationId="{D8008770-5BA1-55CE-818D-DC8603E44B54}"/>
-          </ac:spMkLst>
-        </pc:spChg>
-        <pc:spChg chg="mod">
-          <ac:chgData name="Adrien Osakwe" userId="7a3e290c-eb83-484b-8e3d-d46ef2333477" providerId="ADAL" clId="{ECB69157-50F4-4BCE-8F3E-6963454F02B1}" dt="2025-02-19T15:29:31.020" v="29" actId="1076"/>
-          <ac:spMkLst>
-            <pc:docMk/>
-            <pc:sldMk cId="2389275097" sldId="316"/>
-            <ac:spMk id="4" creationId="{A45C165F-BC2D-0A42-B582-A27AE4DBB9CF}"/>
-          </ac:spMkLst>
-        </pc:spChg>
       </pc:sldChg>
       <pc:sldChg chg="addSp delSp modSp mod">
         <pc:chgData name="Adrien Osakwe" userId="7a3e290c-eb83-484b-8e3d-d46ef2333477" providerId="ADAL" clId="{ECB69157-50F4-4BCE-8F3E-6963454F02B1}" dt="2025-02-19T15:30:37.496" v="64" actId="1076"/>
@@ -602,22 +679,6 @@
           <pc:docMk/>
           <pc:sldMk cId="25426801" sldId="318"/>
         </pc:sldMkLst>
-        <pc:picChg chg="del">
-          <ac:chgData name="Adrien Osakwe" userId="7a3e290c-eb83-484b-8e3d-d46ef2333477" providerId="ADAL" clId="{ECB69157-50F4-4BCE-8F3E-6963454F02B1}" dt="2025-02-19T15:21:32.124" v="0" actId="478"/>
-          <ac:picMkLst>
-            <pc:docMk/>
-            <pc:sldMk cId="25426801" sldId="318"/>
-            <ac:picMk id="3" creationId="{4A401EA9-DEFE-B565-6F9D-CE191A197574}"/>
-          </ac:picMkLst>
-        </pc:picChg>
-        <pc:picChg chg="add mod">
-          <ac:chgData name="Adrien Osakwe" userId="7a3e290c-eb83-484b-8e3d-d46ef2333477" providerId="ADAL" clId="{ECB69157-50F4-4BCE-8F3E-6963454F02B1}" dt="2025-02-19T15:30:37.496" v="64" actId="1076"/>
-          <ac:picMkLst>
-            <pc:docMk/>
-            <pc:sldMk cId="25426801" sldId="318"/>
-            <ac:picMk id="8" creationId="{A26D50DA-518D-0AF2-D362-2940796A3E8A}"/>
-          </ac:picMkLst>
-        </pc:picChg>
       </pc:sldChg>
       <pc:sldChg chg="addSp delSp modSp mod">
         <pc:chgData name="Adrien Osakwe" userId="7a3e290c-eb83-484b-8e3d-d46ef2333477" providerId="ADAL" clId="{ECB69157-50F4-4BCE-8F3E-6963454F02B1}" dt="2025-02-19T15:29:05.128" v="19" actId="12788"/>
@@ -625,30 +686,6 @@
           <pc:docMk/>
           <pc:sldMk cId="3301951615" sldId="338"/>
         </pc:sldMkLst>
-        <pc:spChg chg="del">
-          <ac:chgData name="Adrien Osakwe" userId="7a3e290c-eb83-484b-8e3d-d46ef2333477" providerId="ADAL" clId="{ECB69157-50F4-4BCE-8F3E-6963454F02B1}" dt="2025-02-19T15:28:49.770" v="12" actId="478"/>
-          <ac:spMkLst>
-            <pc:docMk/>
-            <pc:sldMk cId="3301951615" sldId="338"/>
-            <ac:spMk id="2" creationId="{3B626093-774D-D353-9512-85AB782D3038}"/>
-          </ac:spMkLst>
-        </pc:spChg>
-        <pc:spChg chg="mod">
-          <ac:chgData name="Adrien Osakwe" userId="7a3e290c-eb83-484b-8e3d-d46ef2333477" providerId="ADAL" clId="{ECB69157-50F4-4BCE-8F3E-6963454F02B1}" dt="2025-02-19T15:29:05.128" v="19" actId="12788"/>
-          <ac:spMkLst>
-            <pc:docMk/>
-            <pc:sldMk cId="3301951615" sldId="338"/>
-            <ac:spMk id="4" creationId="{FCD96498-6607-422D-4649-CD2575F6D567}"/>
-          </ac:spMkLst>
-        </pc:spChg>
-        <pc:picChg chg="add mod">
-          <ac:chgData name="Adrien Osakwe" userId="7a3e290c-eb83-484b-8e3d-d46ef2333477" providerId="ADAL" clId="{ECB69157-50F4-4BCE-8F3E-6963454F02B1}" dt="2025-02-19T15:29:05.128" v="19" actId="12788"/>
-          <ac:picMkLst>
-            <pc:docMk/>
-            <pc:sldMk cId="3301951615" sldId="338"/>
-            <ac:picMk id="5" creationId="{19B22BFB-B19D-2D0C-A86A-B8456CFB8D45}"/>
-          </ac:picMkLst>
-        </pc:picChg>
       </pc:sldChg>
       <pc:sldChg chg="modSp mod">
         <pc:chgData name="Adrien Osakwe" userId="7a3e290c-eb83-484b-8e3d-d46ef2333477" providerId="ADAL" clId="{ECB69157-50F4-4BCE-8F3E-6963454F02B1}" dt="2025-02-20T15:22:19.143" v="173" actId="6549"/>
@@ -656,22 +693,6 @@
           <pc:docMk/>
           <pc:sldMk cId="742620507" sldId="353"/>
         </pc:sldMkLst>
-        <pc:spChg chg="mod">
-          <ac:chgData name="Adrien Osakwe" userId="7a3e290c-eb83-484b-8e3d-d46ef2333477" providerId="ADAL" clId="{ECB69157-50F4-4BCE-8F3E-6963454F02B1}" dt="2025-02-20T15:22:19.143" v="173" actId="6549"/>
-          <ac:spMkLst>
-            <pc:docMk/>
-            <pc:sldMk cId="742620507" sldId="353"/>
-            <ac:spMk id="3" creationId="{7D6D0FD1-C3AF-4B3B-2756-C8EC565B082F}"/>
-          </ac:spMkLst>
-        </pc:spChg>
-        <pc:spChg chg="mod">
-          <ac:chgData name="Adrien Osakwe" userId="7a3e290c-eb83-484b-8e3d-d46ef2333477" providerId="ADAL" clId="{ECB69157-50F4-4BCE-8F3E-6963454F02B1}" dt="2025-02-19T21:16:34.116" v="139" actId="20577"/>
-          <ac:spMkLst>
-            <pc:docMk/>
-            <pc:sldMk cId="742620507" sldId="353"/>
-            <ac:spMk id="4" creationId="{43578A04-C04F-7F80-6DED-12231FAA1A65}"/>
-          </ac:spMkLst>
-        </pc:spChg>
       </pc:sldChg>
       <pc:sldChg chg="modSp mod">
         <pc:chgData name="Adrien Osakwe" userId="7a3e290c-eb83-484b-8e3d-d46ef2333477" providerId="ADAL" clId="{ECB69157-50F4-4BCE-8F3E-6963454F02B1}" dt="2025-02-20T15:24:11.052" v="221" actId="20577"/>
@@ -679,22 +700,6 @@
           <pc:docMk/>
           <pc:sldMk cId="1189678410" sldId="415"/>
         </pc:sldMkLst>
-        <pc:spChg chg="mod">
-          <ac:chgData name="Adrien Osakwe" userId="7a3e290c-eb83-484b-8e3d-d46ef2333477" providerId="ADAL" clId="{ECB69157-50F4-4BCE-8F3E-6963454F02B1}" dt="2025-02-19T21:20:03.669" v="148" actId="20577"/>
-          <ac:spMkLst>
-            <pc:docMk/>
-            <pc:sldMk cId="1189678410" sldId="415"/>
-            <ac:spMk id="2" creationId="{E961C9E1-74EF-A90A-DC4C-C0F9823CF87A}"/>
-          </ac:spMkLst>
-        </pc:spChg>
-        <pc:spChg chg="mod">
-          <ac:chgData name="Adrien Osakwe" userId="7a3e290c-eb83-484b-8e3d-d46ef2333477" providerId="ADAL" clId="{ECB69157-50F4-4BCE-8F3E-6963454F02B1}" dt="2025-02-20T15:24:11.052" v="221" actId="20577"/>
-          <ac:spMkLst>
-            <pc:docMk/>
-            <pc:sldMk cId="1189678410" sldId="415"/>
-            <ac:spMk id="5" creationId="{B5C65067-8301-83CF-6944-C733754CC10E}"/>
-          </ac:spMkLst>
-        </pc:spChg>
       </pc:sldChg>
       <pc:sldChg chg="ord">
         <pc:chgData name="Adrien Osakwe" userId="7a3e290c-eb83-484b-8e3d-d46ef2333477" providerId="ADAL" clId="{ECB69157-50F4-4BCE-8F3E-6963454F02B1}" dt="2025-02-19T15:28:09.578" v="2"/>
@@ -716,14 +721,6 @@
           <pc:docMk/>
           <pc:sldMk cId="401542667" sldId="455"/>
         </pc:sldMkLst>
-        <pc:spChg chg="mod">
-          <ac:chgData name="Adrien Osakwe" userId="7a3e290c-eb83-484b-8e3d-d46ef2333477" providerId="ADAL" clId="{ECB69157-50F4-4BCE-8F3E-6963454F02B1}" dt="2025-02-20T15:33:07.881" v="224" actId="113"/>
-          <ac:spMkLst>
-            <pc:docMk/>
-            <pc:sldMk cId="401542667" sldId="455"/>
-            <ac:spMk id="3" creationId="{8DB4E871-E104-6882-2745-47F74AF22706}"/>
-          </ac:spMkLst>
-        </pc:spChg>
       </pc:sldChg>
       <pc:sldChg chg="modSp">
         <pc:chgData name="Adrien Osakwe" userId="7a3e290c-eb83-484b-8e3d-d46ef2333477" providerId="ADAL" clId="{ECB69157-50F4-4BCE-8F3E-6963454F02B1}" dt="2025-02-20T17:16:50.767" v="423"/>
@@ -731,14 +728,6 @@
           <pc:docMk/>
           <pc:sldMk cId="3210398204" sldId="456"/>
         </pc:sldMkLst>
-        <pc:spChg chg="mod">
-          <ac:chgData name="Adrien Osakwe" userId="7a3e290c-eb83-484b-8e3d-d46ef2333477" providerId="ADAL" clId="{ECB69157-50F4-4BCE-8F3E-6963454F02B1}" dt="2025-02-20T17:16:50.767" v="423"/>
-          <ac:spMkLst>
-            <pc:docMk/>
-            <pc:sldMk cId="3210398204" sldId="456"/>
-            <ac:spMk id="4" creationId="{9E790FD7-4718-14B8-CF46-983DA0125014}"/>
-          </ac:spMkLst>
-        </pc:spChg>
       </pc:sldChg>
       <pc:sldChg chg="ord">
         <pc:chgData name="Adrien Osakwe" userId="7a3e290c-eb83-484b-8e3d-d46ef2333477" providerId="ADAL" clId="{ECB69157-50F4-4BCE-8F3E-6963454F02B1}" dt="2025-02-19T15:28:09.578" v="2"/>
@@ -753,14 +742,6 @@
           <pc:docMk/>
           <pc:sldMk cId="1864357679" sldId="460"/>
         </pc:sldMkLst>
-        <pc:spChg chg="mod">
-          <ac:chgData name="Adrien Osakwe" userId="7a3e290c-eb83-484b-8e3d-d46ef2333477" providerId="ADAL" clId="{ECB69157-50F4-4BCE-8F3E-6963454F02B1}" dt="2025-02-20T16:55:46.819" v="359" actId="20577"/>
-          <ac:spMkLst>
-            <pc:docMk/>
-            <pc:sldMk cId="1864357679" sldId="460"/>
-            <ac:spMk id="3" creationId="{B85FFC6A-938B-0A41-DFA2-95110E417B0B}"/>
-          </ac:spMkLst>
-        </pc:spChg>
       </pc:sldChg>
       <pc:sldChg chg="modSp mod">
         <pc:chgData name="Adrien Osakwe" userId="7a3e290c-eb83-484b-8e3d-d46ef2333477" providerId="ADAL" clId="{ECB69157-50F4-4BCE-8F3E-6963454F02B1}" dt="2025-02-20T16:57:01.105" v="376" actId="27636"/>
@@ -768,14 +749,6 @@
           <pc:docMk/>
           <pc:sldMk cId="3144204626" sldId="462"/>
         </pc:sldMkLst>
-        <pc:spChg chg="mod">
-          <ac:chgData name="Adrien Osakwe" userId="7a3e290c-eb83-484b-8e3d-d46ef2333477" providerId="ADAL" clId="{ECB69157-50F4-4BCE-8F3E-6963454F02B1}" dt="2025-02-20T16:57:01.105" v="376" actId="27636"/>
-          <ac:spMkLst>
-            <pc:docMk/>
-            <pc:sldMk cId="3144204626" sldId="462"/>
-            <ac:spMk id="3" creationId="{7A07AE36-5E06-9DEF-ECA1-F930F4750B71}"/>
-          </ac:spMkLst>
-        </pc:spChg>
       </pc:sldChg>
       <pc:sldChg chg="modSp mod">
         <pc:chgData name="Adrien Osakwe" userId="7a3e290c-eb83-484b-8e3d-d46ef2333477" providerId="ADAL" clId="{ECB69157-50F4-4BCE-8F3E-6963454F02B1}" dt="2025-02-20T05:18:29.174" v="172" actId="207"/>
@@ -783,14 +756,6 @@
           <pc:docMk/>
           <pc:sldMk cId="2149742431" sldId="464"/>
         </pc:sldMkLst>
-        <pc:spChg chg="mod">
-          <ac:chgData name="Adrien Osakwe" userId="7a3e290c-eb83-484b-8e3d-d46ef2333477" providerId="ADAL" clId="{ECB69157-50F4-4BCE-8F3E-6963454F02B1}" dt="2025-02-20T05:18:29.174" v="172" actId="207"/>
-          <ac:spMkLst>
-            <pc:docMk/>
-            <pc:sldMk cId="2149742431" sldId="464"/>
-            <ac:spMk id="2" creationId="{9BB2392C-D5C3-6070-375F-D3562B7D26F1}"/>
-          </ac:spMkLst>
-        </pc:spChg>
       </pc:sldChg>
       <pc:sldChg chg="modSp mod ord modAnim">
         <pc:chgData name="Adrien Osakwe" userId="7a3e290c-eb83-484b-8e3d-d46ef2333477" providerId="ADAL" clId="{ECB69157-50F4-4BCE-8F3E-6963454F02B1}" dt="2025-02-20T15:36:14.490" v="245" actId="14100"/>
@@ -798,14 +763,6 @@
           <pc:docMk/>
           <pc:sldMk cId="545663224" sldId="465"/>
         </pc:sldMkLst>
-        <pc:spChg chg="mod">
-          <ac:chgData name="Adrien Osakwe" userId="7a3e290c-eb83-484b-8e3d-d46ef2333477" providerId="ADAL" clId="{ECB69157-50F4-4BCE-8F3E-6963454F02B1}" dt="2025-02-20T15:36:14.490" v="245" actId="14100"/>
-          <ac:spMkLst>
-            <pc:docMk/>
-            <pc:sldMk cId="545663224" sldId="465"/>
-            <ac:spMk id="4" creationId="{8B78D07E-1C6C-0831-19C7-1C1A848E098A}"/>
-          </ac:spMkLst>
-        </pc:spChg>
       </pc:sldChg>
       <pc:sldChg chg="ord">
         <pc:chgData name="Adrien Osakwe" userId="7a3e290c-eb83-484b-8e3d-d46ef2333477" providerId="ADAL" clId="{ECB69157-50F4-4BCE-8F3E-6963454F02B1}" dt="2025-02-19T15:28:09.578" v="2"/>
@@ -820,22 +777,6 @@
           <pc:docMk/>
           <pc:sldMk cId="3319858475" sldId="469"/>
         </pc:sldMkLst>
-        <pc:spChg chg="mod">
-          <ac:chgData name="Adrien Osakwe" userId="7a3e290c-eb83-484b-8e3d-d46ef2333477" providerId="ADAL" clId="{ECB69157-50F4-4BCE-8F3E-6963454F02B1}" dt="2025-02-20T15:40:39.652" v="350" actId="20577"/>
-          <ac:spMkLst>
-            <pc:docMk/>
-            <pc:sldMk cId="3319858475" sldId="469"/>
-            <ac:spMk id="3" creationId="{E94F0D39-2848-DE9F-D2ED-AF4FACF6AC2C}"/>
-          </ac:spMkLst>
-        </pc:spChg>
-        <pc:spChg chg="add mod">
-          <ac:chgData name="Adrien Osakwe" userId="7a3e290c-eb83-484b-8e3d-d46ef2333477" providerId="ADAL" clId="{ECB69157-50F4-4BCE-8F3E-6963454F02B1}" dt="2025-02-20T15:39:51.942" v="269" actId="20577"/>
-          <ac:spMkLst>
-            <pc:docMk/>
-            <pc:sldMk cId="3319858475" sldId="469"/>
-            <ac:spMk id="5" creationId="{BDCC88E7-3802-0EBA-6237-309580EAD2C7}"/>
-          </ac:spMkLst>
-        </pc:spChg>
       </pc:sldChg>
       <pc:sldChg chg="ord">
         <pc:chgData name="Adrien Osakwe" userId="7a3e290c-eb83-484b-8e3d-d46ef2333477" providerId="ADAL" clId="{ECB69157-50F4-4BCE-8F3E-6963454F02B1}" dt="2025-02-19T15:28:09.578" v="2"/>
@@ -850,14 +791,6 @@
           <pc:docMk/>
           <pc:sldMk cId="1014294434" sldId="472"/>
         </pc:sldMkLst>
-        <pc:spChg chg="mod">
-          <ac:chgData name="Adrien Osakwe" userId="7a3e290c-eb83-484b-8e3d-d46ef2333477" providerId="ADAL" clId="{ECB69157-50F4-4BCE-8F3E-6963454F02B1}" dt="2025-02-20T15:32:40.112" v="222" actId="113"/>
-          <ac:spMkLst>
-            <pc:docMk/>
-            <pc:sldMk cId="1014294434" sldId="472"/>
-            <ac:spMk id="3" creationId="{16E61E82-8EB2-747B-1ECB-331F155BDCC0}"/>
-          </ac:spMkLst>
-        </pc:spChg>
       </pc:sldChg>
       <pc:sldChg chg="ord">
         <pc:chgData name="Adrien Osakwe" userId="7a3e290c-eb83-484b-8e3d-d46ef2333477" providerId="ADAL" clId="{ECB69157-50F4-4BCE-8F3E-6963454F02B1}" dt="2025-02-19T15:28:09.578" v="2"/>
@@ -872,14 +805,6 @@
           <pc:docMk/>
           <pc:sldMk cId="4253093352" sldId="475"/>
         </pc:sldMkLst>
-        <pc:spChg chg="mod">
-          <ac:chgData name="Adrien Osakwe" userId="7a3e290c-eb83-484b-8e3d-d46ef2333477" providerId="ADAL" clId="{ECB69157-50F4-4BCE-8F3E-6963454F02B1}" dt="2025-02-19T21:46:45.484" v="169" actId="27636"/>
-          <ac:spMkLst>
-            <pc:docMk/>
-            <pc:sldMk cId="4253093352" sldId="475"/>
-            <ac:spMk id="2" creationId="{5568DD53-0E60-48D4-A0EE-A8930702EFE2}"/>
-          </ac:spMkLst>
-        </pc:spChg>
       </pc:sldChg>
       <pc:sldChg chg="modSp mod">
         <pc:chgData name="Adrien Osakwe" userId="7a3e290c-eb83-484b-8e3d-d46ef2333477" providerId="ADAL" clId="{ECB69157-50F4-4BCE-8F3E-6963454F02B1}" dt="2025-02-20T17:10:03.013" v="409" actId="6549"/>
@@ -887,22 +812,6 @@
           <pc:docMk/>
           <pc:sldMk cId="3592411448" sldId="479"/>
         </pc:sldMkLst>
-        <pc:spChg chg="mod">
-          <ac:chgData name="Adrien Osakwe" userId="7a3e290c-eb83-484b-8e3d-d46ef2333477" providerId="ADAL" clId="{ECB69157-50F4-4BCE-8F3E-6963454F02B1}" dt="2025-02-20T05:18:26.134" v="171" actId="207"/>
-          <ac:spMkLst>
-            <pc:docMk/>
-            <pc:sldMk cId="3592411448" sldId="479"/>
-            <ac:spMk id="2" creationId="{80FBF824-DBBC-CF0C-4577-3344C88B0281}"/>
-          </ac:spMkLst>
-        </pc:spChg>
-        <pc:spChg chg="mod">
-          <ac:chgData name="Adrien Osakwe" userId="7a3e290c-eb83-484b-8e3d-d46ef2333477" providerId="ADAL" clId="{ECB69157-50F4-4BCE-8F3E-6963454F02B1}" dt="2025-02-20T17:10:03.013" v="409" actId="6549"/>
-          <ac:spMkLst>
-            <pc:docMk/>
-            <pc:sldMk cId="3592411448" sldId="479"/>
-            <ac:spMk id="3" creationId="{9D4A474C-A228-17C2-D611-129C8F2401B9}"/>
-          </ac:spMkLst>
-        </pc:spChg>
       </pc:sldChg>
       <pc:sldChg chg="modSp new del mod">
         <pc:chgData name="Adrien Osakwe" userId="7a3e290c-eb83-484b-8e3d-d46ef2333477" providerId="ADAL" clId="{ECB69157-50F4-4BCE-8F3E-6963454F02B1}" dt="2025-02-20T05:18:18.657" v="170" actId="47"/>
@@ -910,14 +819,6 @@
           <pc:docMk/>
           <pc:sldMk cId="2832036324" sldId="483"/>
         </pc:sldMkLst>
-        <pc:spChg chg="mod">
-          <ac:chgData name="Adrien Osakwe" userId="7a3e290c-eb83-484b-8e3d-d46ef2333477" providerId="ADAL" clId="{ECB69157-50F4-4BCE-8F3E-6963454F02B1}" dt="2025-02-19T21:45:47.574" v="162" actId="113"/>
-          <ac:spMkLst>
-            <pc:docMk/>
-            <pc:sldMk cId="2832036324" sldId="483"/>
-            <ac:spMk id="2" creationId="{3D86446E-AA24-E8BD-CAD2-9252B1720D9C}"/>
-          </ac:spMkLst>
-        </pc:spChg>
       </pc:sldChg>
     </pc:docChg>
   </pc:docChgLst>
@@ -1018,7 +919,7 @@
           <a:p>
             <a:fld id="{9FF74AA5-8A3E-4FDB-94BB-BF4B31CB4E38}" type="datetimeFigureOut">
               <a:rPr lang="en-CA" smtClean="0"/>
-              <a:t>2025-02-20</a:t>
+              <a:t>2025-07-13</a:t>
             </a:fld>
             <a:endParaRPr lang="en-CA"/>
           </a:p>
@@ -1195,7 +1096,7 @@
           <a:p>
             <a:fld id="{217E5156-1B5D-054E-B5B2-E1B1BA160252}" type="datetimeFigureOut">
               <a:rPr lang="fr-FR" smtClean="0"/>
-              <a:t>20/02/2025</a:t>
+              <a:t>13/07/2025</a:t>
             </a:fld>
             <a:endParaRPr lang="fr-FR"/>
           </a:p>
@@ -3668,7 +3569,11 @@
               <a:rPr lang="en-CA" sz="3200" dirty="0">
                 <a:hlinkClick r:id="rId2"/>
               </a:rPr>
-              <a:t>https://github.com/aosakwe/QLS-MiCM-StatsInR</a:t>
+              <a:t>https://github.com/QLS-MiCM/StatsInR</a:t>
+            </a:r>
+            <a:r>
+              <a:rPr lang="en-CA" sz="3200" dirty="0"/>
+              <a:t> </a:t>
             </a:r>
             <a:br>
               <a:rPr lang="en-CA" sz="3200" dirty="0"/>
@@ -5720,8 +5625,8 @@
           </a:p>
         </p:txBody>
       </p:sp>
-      <mc:AlternateContent xmlns:mc="http://schemas.openxmlformats.org/markup-compatibility/2006">
-        <mc:Choice xmlns:a14="http://schemas.microsoft.com/office/drawing/2010/main" Requires="a14">
+      <mc:AlternateContent xmlns:mc="http://schemas.openxmlformats.org/markup-compatibility/2006" xmlns:a14="http://schemas.microsoft.com/office/drawing/2010/main">
+        <mc:Choice Requires="a14">
           <p:sp>
             <p:nvSpPr>
               <p:cNvPr id="4" name="TextBox 3">
@@ -5887,7 +5792,7 @@
             </p:txBody>
           </p:sp>
         </mc:Choice>
-        <mc:Fallback>
+        <mc:Fallback xmlns="">
           <p:sp>
             <p:nvSpPr>
               <p:cNvPr id="4" name="TextBox 3">
@@ -6872,8 +6777,8 @@
           </p:sp>
         </mc:Fallback>
       </mc:AlternateContent>
-      <mc:AlternateContent xmlns:mc="http://schemas.openxmlformats.org/markup-compatibility/2006">
-        <mc:Choice xmlns:a14="http://schemas.microsoft.com/office/drawing/2010/main" Requires="a14">
+      <mc:AlternateContent xmlns:mc="http://schemas.openxmlformats.org/markup-compatibility/2006" xmlns:a14="http://schemas.microsoft.com/office/drawing/2010/main">
+        <mc:Choice Requires="a14">
           <p:sp>
             <p:nvSpPr>
               <p:cNvPr id="5" name="TextBox 4">
@@ -6902,6 +6807,7 @@
               </a:bodyPr>
               <a:lstStyle/>
               <a:p>
+                <a:pPr/>
                 <a14:m>
                   <m:oMathPara xmlns:m="http://schemas.openxmlformats.org/officeDocument/2006/math">
                     <m:oMathParaPr>
@@ -6933,16 +6839,7 @@
                                 <a:rPr lang="en-CA" sz="1800" b="0" i="0" smtClean="0">
                                   <a:latin typeface="Cambria Math" panose="02040503050406030204" pitchFamily="18" charset="0"/>
                                 </a:rPr>
-                                <m:t>arg</m:t>
-                              </m:r>
-                              <m:r>
-                                <m:rPr>
-                                  <m:sty m:val="p"/>
-                                </m:rPr>
-                                <a:rPr lang="en-CA" sz="1800" b="0" i="0" smtClean="0">
-                                  <a:latin typeface="Cambria Math" panose="02040503050406030204" pitchFamily="18" charset="0"/>
-                                </a:rPr>
-                                <m:t>max</m:t>
+                                <m:t>argmax</m:t>
                               </m:r>
                             </m:e>
                             <m:lim>
@@ -7100,7 +6997,7 @@
             </p:txBody>
           </p:sp>
         </mc:Choice>
-        <mc:Fallback>
+        <mc:Fallback xmlns="">
           <p:sp>
             <p:nvSpPr>
               <p:cNvPr id="5" name="TextBox 4">
@@ -7932,15 +7829,24 @@
               <a:rPr lang="en-CA" sz="2400" dirty="0">
                 <a:latin typeface="Helvetica Light"/>
               </a:rPr>
-              <a:t>Facilitator: Bangli Cao</a:t>
-            </a:r>
+              <a:t>Facilitator: Meghana </a:t>
+            </a:r>
+            <a:r>
+              <a:rPr lang="en-CA" sz="2400" dirty="0" err="1">
+                <a:latin typeface="Helvetica Light"/>
+              </a:rPr>
+              <a:t>Munipalle</a:t>
+            </a:r>
+            <a:endParaRPr lang="en-CA" sz="2400" dirty="0">
+              <a:latin typeface="Helvetica Light"/>
+            </a:endParaRPr>
           </a:p>
           <a:p>
             <a:r>
               <a:rPr lang="en-CA" sz="2400" dirty="0">
                 <a:latin typeface="Helvetica Light"/>
               </a:rPr>
-              <a:t>February 20, 2025</a:t>
+              <a:t>July 17, 2025</a:t>
             </a:r>
           </a:p>
         </p:txBody>
@@ -9021,8 +8927,8 @@
           </a:p>
         </p:txBody>
       </p:sp>
-      <mc:AlternateContent xmlns:mc="http://schemas.openxmlformats.org/markup-compatibility/2006">
-        <mc:Choice xmlns:a14="http://schemas.microsoft.com/office/drawing/2010/main" Requires="a14">
+      <mc:AlternateContent xmlns:mc="http://schemas.openxmlformats.org/markup-compatibility/2006" xmlns:a14="http://schemas.microsoft.com/office/drawing/2010/main">
+        <mc:Choice Requires="a14">
           <p:sp>
             <p:nvSpPr>
               <p:cNvPr id="4" name="TextBox 3">
@@ -9133,7 +9039,7 @@
             </p:txBody>
           </p:sp>
         </mc:Choice>
-        <mc:Fallback>
+        <mc:Fallback xmlns="">
           <p:sp>
             <p:nvSpPr>
               <p:cNvPr id="4" name="TextBox 3">
@@ -9237,8 +9143,8 @@
           </a:p>
         </p:txBody>
       </p:sp>
-      <mc:AlternateContent xmlns:mc="http://schemas.openxmlformats.org/markup-compatibility/2006">
-        <mc:Choice xmlns:a14="http://schemas.microsoft.com/office/drawing/2010/main" Requires="a14">
+      <mc:AlternateContent xmlns:mc="http://schemas.openxmlformats.org/markup-compatibility/2006" xmlns:a14="http://schemas.microsoft.com/office/drawing/2010/main">
+        <mc:Choice Requires="a14">
           <p:sp>
             <p:nvSpPr>
               <p:cNvPr id="3" name="Text Placeholder 2">
@@ -9495,7 +9401,7 @@
             </p:txBody>
           </p:sp>
         </mc:Choice>
-        <mc:Fallback>
+        <mc:Fallback xmlns="">
           <p:sp>
             <p:nvSpPr>
               <p:cNvPr id="3" name="Text Placeholder 2">
@@ -10112,8 +10018,8 @@
           </a:p>
         </p:txBody>
       </p:sp>
-      <mc:AlternateContent xmlns:mc="http://schemas.openxmlformats.org/markup-compatibility/2006">
-        <mc:Choice xmlns:a14="http://schemas.microsoft.com/office/drawing/2010/main" Requires="a14">
+      <mc:AlternateContent xmlns:mc="http://schemas.openxmlformats.org/markup-compatibility/2006" xmlns:a14="http://schemas.microsoft.com/office/drawing/2010/main">
+        <mc:Choice Requires="a14">
           <p:sp>
             <p:nvSpPr>
               <p:cNvPr id="3" name="Text Placeholder 2">
@@ -10389,7 +10295,7 @@
             </p:txBody>
           </p:sp>
         </mc:Choice>
-        <mc:Fallback>
+        <mc:Fallback xmlns="">
           <p:sp>
             <p:nvSpPr>
               <p:cNvPr id="3" name="Text Placeholder 2">
@@ -13591,10 +13497,10 @@
       </p:sp>
       <p:pic>
         <p:nvPicPr>
-          <p:cNvPr id="5" name="Picture 4">
+          <p:cNvPr id="3" name="Picture 2">
             <a:extLst>
               <a:ext uri="{FF2B5EF4-FFF2-40B4-BE49-F238E27FC236}">
-                <a16:creationId xmlns:a16="http://schemas.microsoft.com/office/drawing/2014/main" id="{19B22BFB-B19D-2D0C-A86A-B8456CFB8D45}"/>
+                <a16:creationId xmlns:a16="http://schemas.microsoft.com/office/drawing/2014/main" id="{144E657E-4DB2-77E6-0E22-D9223E12F50D}"/>
               </a:ext>
             </a:extLst>
           </p:cNvPr>
@@ -13611,8 +13517,8 @@
         </p:blipFill>
         <p:spPr>
           <a:xfrm>
-            <a:off x="1094096" y="2049765"/>
-            <a:ext cx="6955808" cy="3220070"/>
+            <a:off x="1712728" y="2029037"/>
+            <a:ext cx="5718543" cy="3261527"/>
           </a:xfrm>
           <a:prstGeom prst="rect">
             <a:avLst/>
@@ -14175,10 +14081,10 @@
       </p:pic>
       <p:pic>
         <p:nvPicPr>
-          <p:cNvPr id="8" name="Picture 7" descr="A qr code with black squares&#10;&#10;AI-generated content may be incorrect.">
+          <p:cNvPr id="13" name="Picture 12" descr="A qr code with black squares&#10;&#10;AI-generated content may be incorrect.">
             <a:extLst>
               <a:ext uri="{FF2B5EF4-FFF2-40B4-BE49-F238E27FC236}">
-                <a16:creationId xmlns:a16="http://schemas.microsoft.com/office/drawing/2014/main" id="{A26D50DA-518D-0AF2-D362-2940796A3E8A}"/>
+                <a16:creationId xmlns:a16="http://schemas.microsoft.com/office/drawing/2014/main" id="{6DF5BB46-1153-E294-A4F1-5DF7C89C4F2C}"/>
               </a:ext>
             </a:extLst>
           </p:cNvPr>
@@ -14195,8 +14101,8 @@
         </p:blipFill>
         <p:spPr>
           <a:xfrm>
-            <a:off x="477191" y="2720175"/>
-            <a:ext cx="2399112" cy="2399112"/>
+            <a:off x="395336" y="2554372"/>
+            <a:ext cx="2526737" cy="2526737"/>
           </a:xfrm>
           <a:prstGeom prst="rect">
             <a:avLst/>

</xml_diff>